<commit_message>
Korrektur: Rechtschreibung von JUnit
</commit_message>
<xml_diff>
--- a/files/Folien.pptx
+++ b/files/Folien.pptx
@@ -127,7 +127,7 @@
   </p:defaultTextStyle>
   <p:extLst>
     <p:ext uri="{EFAFB233-063F-42B5-8137-9DF3F51BA10A}">
-      <p15:sldGuideLst xmlns="" xmlns:p15="http://schemas.microsoft.com/office/powerpoint/2012/main">
+      <p15:sldGuideLst xmlns:p15="http://schemas.microsoft.com/office/powerpoint/2012/main">
         <p15:guide id="1" orient="horz" pos="3146">
           <p15:clr>
             <a:srgbClr val="A4A3A4"/>
@@ -138,7 +138,36 @@
             <a:srgbClr val="A4A3A4"/>
           </p15:clr>
         </p15:guide>
+        <p15:guide id="3" orient="horz" pos="1247">
+          <p15:clr>
+            <a:srgbClr val="A4A3A4"/>
+          </p15:clr>
+        </p15:guide>
+        <p15:guide id="4" orient="horz" pos="2764">
+          <p15:clr>
+            <a:srgbClr val="A4A3A4"/>
+          </p15:clr>
+        </p15:guide>
+        <p15:guide id="5" pos="5543">
+          <p15:clr>
+            <a:srgbClr val="A4A3A4"/>
+          </p15:clr>
+        </p15:guide>
       </p15:sldGuideLst>
+    </p:ext>
+    <p:ext uri="{2D200454-40CA-4A62-9FC3-DE9A4176ACB9}">
+      <p15:notesGuideLst xmlns:p15="http://schemas.microsoft.com/office/powerpoint/2012/main">
+        <p15:guide id="1" orient="horz" pos="3144">
+          <p15:clr>
+            <a:srgbClr val="A4A3A4"/>
+          </p15:clr>
+        </p15:guide>
+        <p15:guide id="2" pos="2140">
+          <p15:clr>
+            <a:srgbClr val="A4A3A4"/>
+          </p15:clr>
+        </p15:guide>
+      </p15:notesGuideLst>
     </p:ext>
   </p:extLst>
 </p:presentation>
@@ -232,7 +261,7 @@
           <a:p>
             <a:fld id="{1869EC12-32BB-B84B-964B-77CD8A6EA5B5}" type="datetimeFigureOut">
               <a:rPr lang="de-DE" smtClean="0"/>
-              <a:t>13.04.2018</a:t>
+              <a:t>26.04.2018</a:t>
             </a:fld>
             <a:endParaRPr lang="de-DE" dirty="0"/>
           </a:p>
@@ -398,7 +427,7 @@
           <a:p>
             <a:fld id="{396D8CEF-220A-EC43-8099-BAE7D65DBE3D}" type="datetimeFigureOut">
               <a:rPr lang="de-DE" smtClean="0"/>
-              <a:t>13.04.2018</a:t>
+              <a:t>26.04.2018</a:t>
             </a:fld>
             <a:endParaRPr lang="de-DE" dirty="0"/>
           </a:p>
@@ -462,38 +491,37 @@
           <a:p>
             <a:pPr lvl="0"/>
             <a:r>
-              <a:rPr lang="de-DE" smtClean="0"/>
+              <a:rPr lang="de-DE"/>
               <a:t>Mastertextformat bearbeiten</a:t>
             </a:r>
           </a:p>
           <a:p>
             <a:pPr lvl="1"/>
             <a:r>
-              <a:rPr lang="de-DE" smtClean="0"/>
+              <a:rPr lang="de-DE"/>
               <a:t>Zweite Ebene</a:t>
             </a:r>
           </a:p>
           <a:p>
             <a:pPr lvl="2"/>
             <a:r>
-              <a:rPr lang="de-DE" smtClean="0"/>
+              <a:rPr lang="de-DE"/>
               <a:t>Dritte Ebene</a:t>
             </a:r>
           </a:p>
           <a:p>
             <a:pPr lvl="3"/>
             <a:r>
-              <a:rPr lang="de-DE" smtClean="0"/>
+              <a:rPr lang="de-DE"/>
               <a:t>Vierte Ebene</a:t>
             </a:r>
           </a:p>
           <a:p>
             <a:pPr lvl="4"/>
             <a:r>
-              <a:rPr lang="de-DE" smtClean="0"/>
+              <a:rPr lang="de-DE"/>
               <a:t>Fünfte Ebene</a:t>
             </a:r>
-            <a:endParaRPr lang="de-DE"/>
           </a:p>
         </p:txBody>
       </p:sp>
@@ -882,10 +910,9 @@
           </a:lstStyle>
           <a:p>
             <a:r>
-              <a:rPr lang="de-DE" dirty="0" smtClean="0"/>
+              <a:rPr lang="de-DE" dirty="0"/>
               <a:t>Kunde</a:t>
             </a:r>
-            <a:endParaRPr lang="de-DE" dirty="0"/>
           </a:p>
         </p:txBody>
       </p:sp>
@@ -921,19 +948,19 @@
           </a:lstStyle>
           <a:p>
             <a:r>
-              <a:rPr lang="en-US" dirty="0" err="1" smtClean="0"/>
+              <a:rPr lang="en-US" dirty="0" err="1"/>
               <a:t>Titel</a:t>
             </a:r>
             <a:r>
-              <a:rPr lang="en-US" dirty="0" smtClean="0"/>
+              <a:rPr lang="en-US" dirty="0"/>
               <a:t> (</a:t>
             </a:r>
             <a:r>
-              <a:rPr lang="en-US" dirty="0" err="1" smtClean="0"/>
+              <a:rPr lang="en-US" dirty="0" err="1"/>
               <a:t>einzeilig</a:t>
             </a:r>
             <a:r>
-              <a:rPr lang="en-US" dirty="0" smtClean="0"/>
+              <a:rPr lang="en-US" dirty="0"/>
               <a:t>)</a:t>
             </a:r>
             <a:endParaRPr lang="de-DE" dirty="0"/>
@@ -1095,10 +1122,10 @@
           <a:p>
             <a:pPr lvl="0"/>
             <a:r>
-              <a:rPr lang="de-DE" dirty="0" err="1" smtClean="0"/>
+              <a:rPr lang="de-DE" dirty="0" err="1"/>
               <a:t>Subtitel</a:t>
             </a:r>
-            <a:endParaRPr lang="de-DE" dirty="0" smtClean="0"/>
+            <a:endParaRPr lang="de-DE" dirty="0"/>
           </a:p>
         </p:txBody>
       </p:sp>
@@ -1135,17 +1162,16 @@
           <a:p>
             <a:pPr lvl="0"/>
             <a:r>
-              <a:rPr lang="de-DE" dirty="0" smtClean="0"/>
+              <a:rPr lang="de-DE" dirty="0"/>
               <a:t>Datum</a:t>
             </a:r>
             <a:br>
-              <a:rPr lang="de-DE" dirty="0" smtClean="0"/>
+              <a:rPr lang="de-DE" dirty="0"/>
             </a:br>
             <a:r>
-              <a:rPr lang="de-DE" dirty="0" smtClean="0"/>
+              <a:rPr lang="de-DE" dirty="0"/>
               <a:t>Ort</a:t>
             </a:r>
-            <a:endParaRPr lang="de-DE" dirty="0"/>
           </a:p>
         </p:txBody>
       </p:sp>
@@ -1180,10 +1206,9 @@
           <a:p>
             <a:pPr lvl="0"/>
             <a:r>
-              <a:rPr lang="de-DE" dirty="0" smtClean="0"/>
+              <a:rPr lang="de-DE" dirty="0"/>
               <a:t>Trainer 1</a:t>
             </a:r>
-            <a:endParaRPr lang="de-DE" dirty="0"/>
           </a:p>
         </p:txBody>
       </p:sp>
@@ -1218,10 +1243,9 @@
           <a:p>
             <a:pPr lvl="0"/>
             <a:r>
-              <a:rPr lang="de-DE" dirty="0" smtClean="0"/>
+              <a:rPr lang="de-DE" dirty="0"/>
               <a:t>Trainer 2</a:t>
             </a:r>
-            <a:endParaRPr lang="de-DE" dirty="0"/>
           </a:p>
         </p:txBody>
       </p:sp>
@@ -1258,10 +1282,9 @@
           <a:p>
             <a:pPr lvl="0"/>
             <a:r>
-              <a:rPr lang="de-DE" dirty="0" smtClean="0"/>
+              <a:rPr lang="de-DE" dirty="0"/>
               <a:t>E-Mail Trainer 1</a:t>
             </a:r>
-            <a:endParaRPr lang="de-DE" dirty="0"/>
           </a:p>
         </p:txBody>
       </p:sp>
@@ -1298,10 +1321,9 @@
           <a:p>
             <a:pPr lvl="0"/>
             <a:r>
-              <a:rPr lang="de-DE" dirty="0" smtClean="0"/>
+              <a:rPr lang="de-DE" dirty="0"/>
               <a:t>E-Mail Trainer 2</a:t>
             </a:r>
-            <a:endParaRPr lang="de-DE" dirty="0"/>
           </a:p>
         </p:txBody>
       </p:sp>
@@ -1351,7 +1373,7 @@
           <a:lstStyle/>
           <a:p>
             <a:r>
-              <a:rPr lang="en-US" smtClean="0"/>
+              <a:rPr lang="en-US"/>
               <a:t>Experts in agile software engineering</a:t>
             </a:r>
             <a:endParaRPr lang="de-DE" dirty="0"/>
@@ -1385,10 +1407,9 @@
           </a:lstStyle>
           <a:p>
             <a:r>
-              <a:rPr lang="de-DE" dirty="0" smtClean="0"/>
+              <a:rPr lang="de-DE" dirty="0"/>
               <a:t>Übung mit Sub ohne Bild</a:t>
             </a:r>
-            <a:endParaRPr lang="de-DE" dirty="0"/>
           </a:p>
         </p:txBody>
       </p:sp>
@@ -1686,10 +1707,9 @@
           </a:lstStyle>
           <a:p>
             <a:r>
-              <a:rPr lang="de-DE" dirty="0" smtClean="0"/>
+              <a:rPr lang="de-DE" dirty="0"/>
               <a:t>10 min</a:t>
             </a:r>
-            <a:endParaRPr lang="de-DE" dirty="0"/>
           </a:p>
         </p:txBody>
       </p:sp>
@@ -1726,14 +1746,13 @@
           <a:p>
             <a:pPr lvl="0"/>
             <a:r>
-              <a:rPr lang="de-DE" dirty="0" err="1" smtClean="0"/>
+              <a:rPr lang="de-DE" dirty="0" err="1"/>
               <a:t>Subtitel</a:t>
             </a:r>
             <a:r>
-              <a:rPr lang="de-DE" dirty="0" smtClean="0"/>
+              <a:rPr lang="de-DE" dirty="0"/>
               <a:t> der Übung</a:t>
             </a:r>
-            <a:endParaRPr lang="de-DE" dirty="0"/>
           </a:p>
         </p:txBody>
       </p:sp>
@@ -1783,7 +1802,7 @@
           <a:lstStyle/>
           <a:p>
             <a:r>
-              <a:rPr lang="en-US" smtClean="0"/>
+              <a:rPr lang="en-US"/>
               <a:t>Experts in agile software engineering</a:t>
             </a:r>
             <a:endParaRPr lang="de-DE" dirty="0"/>
@@ -1817,10 +1836,9 @@
           </a:lstStyle>
           <a:p>
             <a:r>
-              <a:rPr lang="de-DE" dirty="0" smtClean="0"/>
+              <a:rPr lang="de-DE" dirty="0"/>
               <a:t>Text ohne Sub Bild</a:t>
             </a:r>
-            <a:endParaRPr lang="de-DE" dirty="0"/>
           </a:p>
         </p:txBody>
       </p:sp>
@@ -1912,38 +1930,37 @@
           <a:p>
             <a:pPr lvl="0"/>
             <a:r>
-              <a:rPr lang="de-DE" dirty="0" smtClean="0"/>
+              <a:rPr lang="de-DE" dirty="0"/>
               <a:t>Und wenn Du kein Bild brauchst, dann einfach den Textrahmen nach rechts vergrößern</a:t>
             </a:r>
           </a:p>
           <a:p>
             <a:pPr lvl="1"/>
             <a:r>
-              <a:rPr lang="de-DE" dirty="0" smtClean="0"/>
+              <a:rPr lang="de-DE" dirty="0"/>
               <a:t>Zweite Ebene</a:t>
             </a:r>
           </a:p>
           <a:p>
             <a:pPr lvl="2"/>
             <a:r>
-              <a:rPr lang="de-DE" dirty="0" smtClean="0"/>
+              <a:rPr lang="de-DE" dirty="0"/>
               <a:t>Dritte Ebene</a:t>
             </a:r>
           </a:p>
           <a:p>
             <a:pPr lvl="3"/>
             <a:r>
-              <a:rPr lang="de-DE" dirty="0" smtClean="0"/>
+              <a:rPr lang="de-DE" dirty="0"/>
               <a:t>Vierte Ebene</a:t>
             </a:r>
           </a:p>
           <a:p>
             <a:pPr lvl="4"/>
             <a:r>
-              <a:rPr lang="de-DE" dirty="0" smtClean="0"/>
+              <a:rPr lang="de-DE" dirty="0"/>
               <a:t>Fünfte Ebene</a:t>
             </a:r>
-            <a:endParaRPr lang="de-DE" dirty="0"/>
           </a:p>
         </p:txBody>
       </p:sp>
@@ -2065,13 +2082,6 @@
   <p:clrMapOvr>
     <a:masterClrMapping/>
   </p:clrMapOvr>
-  <p:timing>
-    <p:tnLst>
-      <p:par>
-        <p:cTn id="1" dur="indefinite" restart="never" nodeType="tmRoot"/>
-      </p:par>
-    </p:tnLst>
-  </p:timing>
 </p:sldLayout>
 </file>
 
@@ -2108,7 +2118,7 @@
           <a:lstStyle/>
           <a:p>
             <a:r>
-              <a:rPr lang="en-US" smtClean="0"/>
+              <a:rPr lang="en-US"/>
               <a:t>Experts in agile software engineering</a:t>
             </a:r>
             <a:endParaRPr lang="de-DE" dirty="0"/>
@@ -2142,10 +2152,9 @@
           </a:lstStyle>
           <a:p>
             <a:r>
-              <a:rPr lang="de-DE" dirty="0" smtClean="0"/>
+              <a:rPr lang="de-DE" dirty="0"/>
               <a:t>Text ohne Sub ohne Bild</a:t>
             </a:r>
-            <a:endParaRPr lang="de-DE" dirty="0"/>
           </a:p>
         </p:txBody>
       </p:sp>
@@ -2238,41 +2247,36 @@
             <a:pPr lvl="0"/>
             <a:r>
               <a:rPr lang="de-DE" dirty="0"/>
-              <a:t>Textmasterformat </a:t>
-            </a:r>
-            <a:r>
-              <a:rPr lang="de-DE" dirty="0" smtClean="0"/>
-              <a:t>bearbeiten</a:t>
+              <a:t>Textmasterformat bearbeiten</a:t>
             </a:r>
           </a:p>
           <a:p>
             <a:pPr lvl="1"/>
             <a:r>
-              <a:rPr lang="de-DE" dirty="0" smtClean="0"/>
+              <a:rPr lang="de-DE" dirty="0"/>
               <a:t>Zweite Ebene</a:t>
             </a:r>
           </a:p>
           <a:p>
             <a:pPr lvl="2"/>
             <a:r>
-              <a:rPr lang="de-DE" dirty="0" smtClean="0"/>
+              <a:rPr lang="de-DE" dirty="0"/>
               <a:t>Dritte Ebene</a:t>
             </a:r>
           </a:p>
           <a:p>
             <a:pPr lvl="3"/>
             <a:r>
-              <a:rPr lang="de-DE" dirty="0" smtClean="0"/>
+              <a:rPr lang="de-DE" dirty="0"/>
               <a:t>Vierte Ebene</a:t>
             </a:r>
           </a:p>
           <a:p>
             <a:pPr lvl="4"/>
             <a:r>
-              <a:rPr lang="de-DE" dirty="0" smtClean="0"/>
+              <a:rPr lang="de-DE" dirty="0"/>
               <a:t>Fünfte Ebene</a:t>
             </a:r>
-            <a:endParaRPr lang="de-DE" dirty="0"/>
           </a:p>
         </p:txBody>
       </p:sp>
@@ -2394,13 +2398,6 @@
   <p:clrMapOvr>
     <a:masterClrMapping/>
   </p:clrMapOvr>
-  <p:timing>
-    <p:tnLst>
-      <p:par>
-        <p:cTn id="1" dur="indefinite" restart="never" nodeType="tmRoot"/>
-      </p:par>
-    </p:tnLst>
-  </p:timing>
 </p:sldLayout>
 </file>
 
@@ -2437,7 +2434,7 @@
           <a:lstStyle/>
           <a:p>
             <a:r>
-              <a:rPr lang="en-US" smtClean="0"/>
+              <a:rPr lang="en-US"/>
               <a:t>Experts in agile software engineering</a:t>
             </a:r>
             <a:endParaRPr lang="de-DE" dirty="0"/>
@@ -2471,10 +2468,9 @@
           </a:lstStyle>
           <a:p>
             <a:r>
-              <a:rPr lang="de-DE" dirty="0" smtClean="0"/>
+              <a:rPr lang="de-DE" dirty="0"/>
               <a:t>Text mit Sub Bild</a:t>
             </a:r>
-            <a:endParaRPr lang="de-DE" dirty="0"/>
           </a:p>
         </p:txBody>
       </p:sp>
@@ -2567,41 +2563,36 @@
             <a:pPr lvl="0"/>
             <a:r>
               <a:rPr lang="de-DE" dirty="0"/>
-              <a:t>Textmasterformat </a:t>
-            </a:r>
-            <a:r>
-              <a:rPr lang="de-DE" dirty="0" smtClean="0"/>
-              <a:t>bearbeiten</a:t>
+              <a:t>Textmasterformat bearbeiten</a:t>
             </a:r>
           </a:p>
           <a:p>
             <a:pPr lvl="1"/>
             <a:r>
-              <a:rPr lang="de-DE" dirty="0" smtClean="0"/>
+              <a:rPr lang="de-DE" dirty="0"/>
               <a:t>Zweite Ebene</a:t>
             </a:r>
           </a:p>
           <a:p>
             <a:pPr lvl="2"/>
             <a:r>
-              <a:rPr lang="de-DE" dirty="0" smtClean="0"/>
+              <a:rPr lang="de-DE" dirty="0"/>
               <a:t>Dritte Ebene</a:t>
             </a:r>
           </a:p>
           <a:p>
             <a:pPr lvl="3"/>
             <a:r>
-              <a:rPr lang="de-DE" dirty="0" smtClean="0"/>
+              <a:rPr lang="de-DE" dirty="0"/>
               <a:t>Vierte Ebene</a:t>
             </a:r>
           </a:p>
           <a:p>
             <a:pPr lvl="4"/>
             <a:r>
-              <a:rPr lang="de-DE" dirty="0" smtClean="0"/>
+              <a:rPr lang="de-DE" dirty="0"/>
               <a:t>Fünfte Ebene</a:t>
             </a:r>
-            <a:endParaRPr lang="de-DE" dirty="0"/>
           </a:p>
         </p:txBody>
       </p:sp>
@@ -2746,7 +2737,7 @@
           <a:p>
             <a:pPr lvl="0"/>
             <a:r>
-              <a:rPr lang="de-DE" dirty="0" err="1" smtClean="0"/>
+              <a:rPr lang="de-DE" dirty="0" err="1"/>
               <a:t>Subtitel</a:t>
             </a:r>
             <a:endParaRPr lang="de-DE" dirty="0"/>
@@ -2763,13 +2754,6 @@
   <p:clrMapOvr>
     <a:masterClrMapping/>
   </p:clrMapOvr>
-  <p:timing>
-    <p:tnLst>
-      <p:par>
-        <p:cTn id="1" dur="indefinite" restart="never" nodeType="tmRoot"/>
-      </p:par>
-    </p:tnLst>
-  </p:timing>
 </p:sldLayout>
 </file>
 
@@ -2806,7 +2790,7 @@
           <a:lstStyle/>
           <a:p>
             <a:r>
-              <a:rPr lang="en-US" smtClean="0"/>
+              <a:rPr lang="en-US"/>
               <a:t>Experts in agile software engineering</a:t>
             </a:r>
             <a:endParaRPr lang="de-DE" dirty="0"/>
@@ -2840,10 +2824,9 @@
           </a:lstStyle>
           <a:p>
             <a:r>
-              <a:rPr lang="de-DE" dirty="0" smtClean="0"/>
+              <a:rPr lang="de-DE" dirty="0"/>
               <a:t>Text mit Sub ohne Bild</a:t>
             </a:r>
-            <a:endParaRPr lang="de-DE" dirty="0"/>
           </a:p>
         </p:txBody>
       </p:sp>
@@ -2936,41 +2919,36 @@
             <a:pPr lvl="0"/>
             <a:r>
               <a:rPr lang="de-DE" dirty="0"/>
-              <a:t>Textmasterformat </a:t>
-            </a:r>
-            <a:r>
-              <a:rPr lang="de-DE" dirty="0" smtClean="0"/>
-              <a:t>bearbeiten</a:t>
+              <a:t>Textmasterformat bearbeiten</a:t>
             </a:r>
           </a:p>
           <a:p>
             <a:pPr lvl="1"/>
             <a:r>
-              <a:rPr lang="de-DE" dirty="0" smtClean="0"/>
+              <a:rPr lang="de-DE" dirty="0"/>
               <a:t>Zweite Ebene</a:t>
             </a:r>
           </a:p>
           <a:p>
             <a:pPr lvl="2"/>
             <a:r>
-              <a:rPr lang="de-DE" dirty="0" smtClean="0"/>
+              <a:rPr lang="de-DE" dirty="0"/>
               <a:t>Dritte Ebene</a:t>
             </a:r>
           </a:p>
           <a:p>
             <a:pPr lvl="3"/>
             <a:r>
-              <a:rPr lang="de-DE" dirty="0" smtClean="0"/>
+              <a:rPr lang="de-DE" dirty="0"/>
               <a:t>Vierte Ebene</a:t>
             </a:r>
           </a:p>
           <a:p>
             <a:pPr lvl="4"/>
             <a:r>
-              <a:rPr lang="de-DE" dirty="0" smtClean="0"/>
+              <a:rPr lang="de-DE" dirty="0"/>
               <a:t>Fünfte Ebene</a:t>
             </a:r>
-            <a:endParaRPr lang="de-DE" dirty="0"/>
           </a:p>
         </p:txBody>
       </p:sp>
@@ -3115,7 +3093,7 @@
           <a:p>
             <a:pPr lvl="0"/>
             <a:r>
-              <a:rPr lang="de-DE" dirty="0" err="1" smtClean="0"/>
+              <a:rPr lang="de-DE" dirty="0" err="1"/>
               <a:t>Subtitel</a:t>
             </a:r>
             <a:endParaRPr lang="de-DE" dirty="0"/>
@@ -3132,13 +3110,6 @@
   <p:clrMapOvr>
     <a:masterClrMapping/>
   </p:clrMapOvr>
-  <p:timing>
-    <p:tnLst>
-      <p:par>
-        <p:cTn id="1" dur="indefinite" restart="never" nodeType="tmRoot"/>
-      </p:par>
-    </p:tnLst>
-  </p:timing>
 </p:sldLayout>
 </file>
 
@@ -3175,10 +3146,9 @@
           <a:lstStyle/>
           <a:p>
             <a:r>
-              <a:rPr lang="de-DE" dirty="0" smtClean="0"/>
+              <a:rPr lang="de-DE" dirty="0"/>
               <a:t>Titelmasterformat durch Klicken bearbeiten</a:t>
             </a:r>
-            <a:endParaRPr lang="de-DE" dirty="0"/>
           </a:p>
         </p:txBody>
       </p:sp>
@@ -3198,7 +3168,7 @@
           <a:lstStyle/>
           <a:p>
             <a:r>
-              <a:rPr lang="en-US" smtClean="0"/>
+              <a:rPr lang="en-US"/>
               <a:t>Experts in agile software engineering</a:t>
             </a:r>
             <a:endParaRPr lang="de-DE" dirty="0"/>
@@ -3275,10 +3245,9 @@
           <a:lstStyle/>
           <a:p>
             <a:r>
-              <a:rPr lang="de-DE" dirty="0" smtClean="0"/>
+              <a:rPr lang="de-DE" dirty="0"/>
               <a:t>Titelmasterformat durch Klicken bearbeiten</a:t>
             </a:r>
-            <a:endParaRPr lang="de-DE" dirty="0"/>
           </a:p>
         </p:txBody>
       </p:sp>
@@ -3298,7 +3267,7 @@
           <a:lstStyle/>
           <a:p>
             <a:r>
-              <a:rPr lang="en-US" smtClean="0"/>
+              <a:rPr lang="en-US"/>
               <a:t>Experts in agile software engineering</a:t>
             </a:r>
             <a:endParaRPr lang="de-DE" dirty="0"/>
@@ -3362,7 +3331,7 @@
           <a:p>
             <a:pPr lvl="0"/>
             <a:r>
-              <a:rPr lang="de-DE" dirty="0" err="1" smtClean="0"/>
+              <a:rPr lang="de-DE" dirty="0" err="1"/>
               <a:t>Subtitel</a:t>
             </a:r>
             <a:endParaRPr lang="de-DE" dirty="0"/>
@@ -3468,15 +3437,15 @@
           <a:p>
             <a:pPr lvl="0"/>
             <a:r>
-              <a:rPr lang="en-US" dirty="0" err="1" smtClean="0"/>
+              <a:rPr lang="en-US" dirty="0" err="1"/>
               <a:t>Erste</a:t>
             </a:r>
             <a:r>
-              <a:rPr lang="en-US" dirty="0" smtClean="0"/>
+              <a:rPr lang="en-US" dirty="0"/>
               <a:t> </a:t>
             </a:r>
             <a:r>
-              <a:rPr lang="en-US" dirty="0" err="1" smtClean="0"/>
+              <a:rPr lang="en-US" dirty="0" err="1"/>
               <a:t>Ebene</a:t>
             </a:r>
             <a:endParaRPr lang="en-US" dirty="0"/>
@@ -3484,15 +3453,15 @@
           <a:p>
             <a:pPr lvl="1"/>
             <a:r>
-              <a:rPr lang="en-US" dirty="0" err="1" smtClean="0"/>
+              <a:rPr lang="en-US" dirty="0" err="1"/>
               <a:t>Zweite</a:t>
             </a:r>
             <a:r>
-              <a:rPr lang="en-US" dirty="0" smtClean="0"/>
+              <a:rPr lang="en-US" dirty="0"/>
               <a:t> </a:t>
             </a:r>
             <a:r>
-              <a:rPr lang="en-US" dirty="0" err="1" smtClean="0"/>
+              <a:rPr lang="en-US" dirty="0" err="1"/>
               <a:t>Ebene</a:t>
             </a:r>
             <a:endParaRPr lang="en-US" dirty="0"/>
@@ -3500,15 +3469,15 @@
           <a:p>
             <a:pPr lvl="2"/>
             <a:r>
-              <a:rPr lang="en-US" dirty="0" err="1" smtClean="0"/>
+              <a:rPr lang="en-US" dirty="0" err="1"/>
               <a:t>Dritte</a:t>
             </a:r>
             <a:r>
-              <a:rPr lang="en-US" dirty="0" smtClean="0"/>
+              <a:rPr lang="en-US" dirty="0"/>
               <a:t> </a:t>
             </a:r>
             <a:r>
-              <a:rPr lang="en-US" dirty="0" err="1" smtClean="0"/>
+              <a:rPr lang="en-US" dirty="0" err="1"/>
               <a:t>Ebene</a:t>
             </a:r>
             <a:endParaRPr lang="en-US" dirty="0"/>
@@ -3584,15 +3553,15 @@
           <a:p>
             <a:pPr lvl="0"/>
             <a:r>
-              <a:rPr lang="en-US" dirty="0" err="1" smtClean="0"/>
+              <a:rPr lang="en-US" dirty="0" err="1"/>
               <a:t>Erste</a:t>
             </a:r>
             <a:r>
-              <a:rPr lang="en-US" dirty="0" smtClean="0"/>
+              <a:rPr lang="en-US" dirty="0"/>
               <a:t> </a:t>
             </a:r>
             <a:r>
-              <a:rPr lang="en-US" dirty="0" err="1" smtClean="0"/>
+              <a:rPr lang="en-US" dirty="0" err="1"/>
               <a:t>Ebene</a:t>
             </a:r>
             <a:endParaRPr lang="en-US" dirty="0"/>
@@ -3600,15 +3569,15 @@
           <a:p>
             <a:pPr lvl="1"/>
             <a:r>
-              <a:rPr lang="en-US" dirty="0" err="1" smtClean="0"/>
+              <a:rPr lang="en-US" dirty="0" err="1"/>
               <a:t>Zweite</a:t>
             </a:r>
             <a:r>
-              <a:rPr lang="en-US" dirty="0" smtClean="0"/>
+              <a:rPr lang="en-US" dirty="0"/>
               <a:t> </a:t>
             </a:r>
             <a:r>
-              <a:rPr lang="en-US" dirty="0" err="1" smtClean="0"/>
+              <a:rPr lang="en-US" dirty="0" err="1"/>
               <a:t>Ebene</a:t>
             </a:r>
             <a:endParaRPr lang="en-US" dirty="0"/>
@@ -3616,15 +3585,15 @@
           <a:p>
             <a:pPr lvl="2"/>
             <a:r>
-              <a:rPr lang="en-US" dirty="0" err="1" smtClean="0"/>
+              <a:rPr lang="en-US" dirty="0" err="1"/>
               <a:t>Dritte</a:t>
             </a:r>
             <a:r>
-              <a:rPr lang="en-US" dirty="0" smtClean="0"/>
+              <a:rPr lang="en-US" dirty="0"/>
               <a:t> </a:t>
             </a:r>
             <a:r>
-              <a:rPr lang="en-US" dirty="0" err="1" smtClean="0"/>
+              <a:rPr lang="en-US" dirty="0" err="1"/>
               <a:t>Ebene</a:t>
             </a:r>
             <a:endParaRPr lang="en-US" dirty="0"/>
@@ -3793,7 +3762,7 @@
           <a:lstStyle/>
           <a:p>
             <a:r>
-              <a:rPr lang="en-US" smtClean="0"/>
+              <a:rPr lang="en-US"/>
               <a:t>Experts in agile software engineering</a:t>
             </a:r>
             <a:endParaRPr lang="de-DE" dirty="0"/>
@@ -3839,10 +3808,9 @@
           <a:p>
             <a:pPr lvl="0"/>
             <a:r>
-              <a:rPr lang="de-DE" dirty="0" smtClean="0"/>
+              <a:rPr lang="de-DE" dirty="0"/>
               <a:t>Titel</a:t>
             </a:r>
-            <a:endParaRPr lang="de-DE" dirty="0"/>
           </a:p>
         </p:txBody>
       </p:sp>
@@ -3885,10 +3853,9 @@
           <a:p>
             <a:pPr lvl="0"/>
             <a:r>
-              <a:rPr lang="de-DE" dirty="0" smtClean="0"/>
+              <a:rPr lang="de-DE" dirty="0"/>
               <a:t>Titel</a:t>
             </a:r>
-            <a:endParaRPr lang="de-DE" dirty="0"/>
           </a:p>
         </p:txBody>
       </p:sp>
@@ -4120,13 +4087,6 @@
   <p:clrMapOvr>
     <a:masterClrMapping/>
   </p:clrMapOvr>
-  <p:timing>
-    <p:tnLst>
-      <p:par>
-        <p:cTn id="1" dur="indefinite" restart="never" nodeType="tmRoot"/>
-      </p:par>
-    </p:tnLst>
-  </p:timing>
 </p:sldLayout>
 </file>
 
@@ -4163,14 +4123,14 @@
           <a:lstStyle/>
           <a:p>
             <a:r>
-              <a:rPr lang="en-US" smtClean="0">
+              <a:rPr lang="en-US">
                 <a:solidFill>
                   <a:srgbClr val="BABABA"/>
                 </a:solidFill>
               </a:rPr>
               <a:t>Experts in agile software engineering</a:t>
             </a:r>
-            <a:endParaRPr lang="de-DE" dirty="0" smtClean="0">
+            <a:endParaRPr lang="de-DE" dirty="0">
               <a:solidFill>
                 <a:srgbClr val="BABABA"/>
               </a:solidFill>
@@ -4348,22 +4308,21 @@
           </a:lstStyle>
           <a:p>
             <a:r>
-              <a:rPr lang="en-US" dirty="0" err="1" smtClean="0"/>
+              <a:rPr lang="en-US" dirty="0" err="1"/>
               <a:t>Titel</a:t>
             </a:r>
             <a:r>
-              <a:rPr lang="en-US" dirty="0" smtClean="0"/>
+              <a:rPr lang="en-US" dirty="0"/>
               <a:t> (</a:t>
             </a:r>
             <a:r>
-              <a:rPr lang="en-US" dirty="0" err="1" smtClean="0"/>
+              <a:rPr lang="en-US" dirty="0" err="1"/>
               <a:t>einzeilig</a:t>
             </a:r>
             <a:r>
-              <a:rPr lang="en-US" dirty="0" smtClean="0"/>
+              <a:rPr lang="en-US" dirty="0"/>
               <a:t>)</a:t>
             </a:r>
-            <a:endParaRPr lang="en-US" dirty="0"/>
           </a:p>
         </p:txBody>
       </p:sp>
@@ -4400,7 +4359,7 @@
           <a:p>
             <a:pPr lvl="0"/>
             <a:r>
-              <a:rPr lang="de-DE" dirty="0" err="1" smtClean="0"/>
+              <a:rPr lang="de-DE" dirty="0" err="1"/>
               <a:t>Subtitel</a:t>
             </a:r>
             <a:endParaRPr lang="de-DE" dirty="0"/>
@@ -4453,14 +4412,14 @@
           <a:lstStyle/>
           <a:p>
             <a:r>
-              <a:rPr lang="en-US" smtClean="0">
+              <a:rPr lang="en-US">
                 <a:solidFill>
                   <a:srgbClr val="BABABA"/>
                 </a:solidFill>
               </a:rPr>
               <a:t>Experts in agile software engineering</a:t>
             </a:r>
-            <a:endParaRPr lang="de-DE" dirty="0" smtClean="0">
+            <a:endParaRPr lang="de-DE" dirty="0">
               <a:solidFill>
                 <a:srgbClr val="BABABA"/>
               </a:solidFill>
@@ -4638,34 +4597,34 @@
           </a:lstStyle>
           <a:p>
             <a:r>
-              <a:rPr lang="en-US" dirty="0" err="1" smtClean="0"/>
+              <a:rPr lang="en-US" dirty="0" err="1"/>
               <a:t>Titel</a:t>
             </a:r>
             <a:r>
-              <a:rPr lang="en-US" dirty="0" smtClean="0"/>
+              <a:rPr lang="en-US" dirty="0"/>
               <a:t> </a:t>
             </a:r>
             <a:br>
-              <a:rPr lang="en-US" dirty="0" smtClean="0"/>
+              <a:rPr lang="en-US" dirty="0"/>
             </a:br>
             <a:r>
-              <a:rPr lang="en-US" dirty="0" err="1" smtClean="0"/>
+              <a:rPr lang="en-US" dirty="0" err="1"/>
               <a:t>zweite</a:t>
             </a:r>
             <a:r>
-              <a:rPr lang="en-US" dirty="0" smtClean="0"/>
+              <a:rPr lang="en-US" dirty="0"/>
               <a:t> </a:t>
             </a:r>
             <a:r>
-              <a:rPr lang="en-US" dirty="0" err="1" smtClean="0"/>
+              <a:rPr lang="en-US" dirty="0" err="1"/>
               <a:t>Zeile</a:t>
             </a:r>
             <a:r>
-              <a:rPr lang="en-US" dirty="0" smtClean="0"/>
+              <a:rPr lang="en-US" dirty="0"/>
               <a:t> </a:t>
             </a:r>
             <a:r>
-              <a:rPr lang="en-US" dirty="0" err="1" smtClean="0"/>
+              <a:rPr lang="en-US" dirty="0" err="1"/>
               <a:t>Titel</a:t>
             </a:r>
             <a:endParaRPr lang="en-US" dirty="0"/>
@@ -4705,7 +4664,7 @@
           <a:p>
             <a:pPr lvl="0"/>
             <a:r>
-              <a:rPr lang="de-DE" dirty="0" err="1" smtClean="0"/>
+              <a:rPr lang="de-DE" dirty="0" err="1"/>
               <a:t>Subtitel</a:t>
             </a:r>
             <a:endParaRPr lang="de-DE" dirty="0"/>
@@ -4940,10 +4899,9 @@
           </a:lstStyle>
           <a:p>
             <a:r>
-              <a:rPr lang="de-DE" dirty="0" smtClean="0"/>
+              <a:rPr lang="de-DE" dirty="0"/>
               <a:t>Kunde</a:t>
             </a:r>
-            <a:endParaRPr lang="de-DE" dirty="0"/>
           </a:p>
         </p:txBody>
       </p:sp>
@@ -4981,42 +4939,42 @@
           </a:lstStyle>
           <a:p>
             <a:r>
-              <a:rPr lang="en-US" dirty="0" err="1" smtClean="0"/>
+              <a:rPr lang="en-US" dirty="0" err="1"/>
               <a:t>Titel</a:t>
             </a:r>
             <a:r>
-              <a:rPr lang="en-US" dirty="0" smtClean="0"/>
+              <a:rPr lang="en-US" dirty="0"/>
               <a:t> (</a:t>
             </a:r>
             <a:r>
-              <a:rPr lang="en-US" dirty="0" err="1" smtClean="0"/>
+              <a:rPr lang="en-US" dirty="0" err="1"/>
               <a:t>einzeilig</a:t>
             </a:r>
             <a:r>
-              <a:rPr lang="en-US" dirty="0" smtClean="0"/>
+              <a:rPr lang="en-US" dirty="0"/>
               <a:t>)</a:t>
             </a:r>
             <a:br>
-              <a:rPr lang="en-US" dirty="0" smtClean="0"/>
+              <a:rPr lang="en-US" dirty="0"/>
             </a:br>
             <a:r>
-              <a:rPr lang="en-US" dirty="0" err="1" smtClean="0"/>
+              <a:rPr lang="en-US" dirty="0" err="1"/>
               <a:t>zweite</a:t>
             </a:r>
             <a:r>
-              <a:rPr lang="en-US" dirty="0" smtClean="0"/>
+              <a:rPr lang="en-US" dirty="0"/>
               <a:t> </a:t>
             </a:r>
             <a:r>
-              <a:rPr lang="en-US" dirty="0" err="1" smtClean="0"/>
+              <a:rPr lang="en-US" dirty="0" err="1"/>
               <a:t>Zeile</a:t>
             </a:r>
             <a:r>
-              <a:rPr lang="en-US" dirty="0" smtClean="0"/>
+              <a:rPr lang="en-US" dirty="0"/>
               <a:t> </a:t>
             </a:r>
             <a:r>
-              <a:rPr lang="en-US" dirty="0" err="1" smtClean="0"/>
+              <a:rPr lang="en-US" dirty="0" err="1"/>
               <a:t>Titel</a:t>
             </a:r>
             <a:endParaRPr lang="de-DE" dirty="0"/>
@@ -5178,10 +5136,10 @@
           <a:p>
             <a:pPr lvl="0"/>
             <a:r>
-              <a:rPr lang="de-DE" dirty="0" err="1" smtClean="0"/>
+              <a:rPr lang="de-DE" dirty="0" err="1"/>
               <a:t>Subtitel</a:t>
             </a:r>
-            <a:endParaRPr lang="de-DE" dirty="0" smtClean="0"/>
+            <a:endParaRPr lang="de-DE" dirty="0"/>
           </a:p>
         </p:txBody>
       </p:sp>
@@ -5218,17 +5176,16 @@
           <a:p>
             <a:pPr lvl="0"/>
             <a:r>
-              <a:rPr lang="de-DE" dirty="0" smtClean="0"/>
+              <a:rPr lang="de-DE" dirty="0"/>
               <a:t>Datum</a:t>
             </a:r>
             <a:br>
-              <a:rPr lang="de-DE" dirty="0" smtClean="0"/>
+              <a:rPr lang="de-DE" dirty="0"/>
             </a:br>
             <a:r>
-              <a:rPr lang="de-DE" dirty="0" smtClean="0"/>
+              <a:rPr lang="de-DE" dirty="0"/>
               <a:t>Ort</a:t>
             </a:r>
-            <a:endParaRPr lang="de-DE" dirty="0"/>
           </a:p>
         </p:txBody>
       </p:sp>
@@ -5263,10 +5220,9 @@
           <a:p>
             <a:pPr lvl="0"/>
             <a:r>
-              <a:rPr lang="de-DE" dirty="0" smtClean="0"/>
+              <a:rPr lang="de-DE" dirty="0"/>
               <a:t>Trainer 1</a:t>
             </a:r>
-            <a:endParaRPr lang="de-DE" dirty="0"/>
           </a:p>
         </p:txBody>
       </p:sp>
@@ -5301,10 +5257,9 @@
           <a:p>
             <a:pPr lvl="0"/>
             <a:r>
-              <a:rPr lang="de-DE" dirty="0" smtClean="0"/>
+              <a:rPr lang="de-DE" dirty="0"/>
               <a:t>Trainer 2</a:t>
             </a:r>
-            <a:endParaRPr lang="de-DE" dirty="0"/>
           </a:p>
         </p:txBody>
       </p:sp>
@@ -5341,10 +5296,9 @@
           <a:p>
             <a:pPr lvl="0"/>
             <a:r>
-              <a:rPr lang="de-DE" dirty="0" smtClean="0"/>
+              <a:rPr lang="de-DE" dirty="0"/>
               <a:t>E-Mail Trainer 1</a:t>
             </a:r>
-            <a:endParaRPr lang="de-DE" dirty="0"/>
           </a:p>
         </p:txBody>
       </p:sp>
@@ -5381,10 +5335,9 @@
           <a:p>
             <a:pPr lvl="0"/>
             <a:r>
-              <a:rPr lang="de-DE" dirty="0" smtClean="0"/>
+              <a:rPr lang="de-DE" dirty="0"/>
               <a:t>E-Mail Trainer 2</a:t>
             </a:r>
-            <a:endParaRPr lang="de-DE" dirty="0"/>
           </a:p>
         </p:txBody>
       </p:sp>
@@ -5564,10 +5517,9 @@
           </a:lstStyle>
           <a:p>
             <a:r>
-              <a:rPr lang="de-DE" dirty="0" smtClean="0"/>
+              <a:rPr lang="de-DE" dirty="0"/>
               <a:t>Agenda ohne Sub Bild </a:t>
             </a:r>
-            <a:endParaRPr lang="de-DE" dirty="0"/>
           </a:p>
         </p:txBody>
       </p:sp>
@@ -5760,17 +5712,13 @@
             <a:pPr lvl="0"/>
             <a:r>
               <a:rPr lang="de-DE" dirty="0"/>
-              <a:t>Textmasterformat </a:t>
-            </a:r>
-            <a:r>
-              <a:rPr lang="de-DE" dirty="0" smtClean="0"/>
-              <a:t>bearbeiten</a:t>
+              <a:t>Textmasterformat bearbeiten</a:t>
             </a:r>
           </a:p>
           <a:p>
             <a:pPr lvl="0"/>
             <a:r>
-              <a:rPr lang="de-DE" dirty="0" smtClean="0"/>
+              <a:rPr lang="de-DE" dirty="0"/>
               <a:t>Zweite Zeile</a:t>
             </a:r>
           </a:p>
@@ -5956,10 +5904,9 @@
           </a:lstStyle>
           <a:p>
             <a:r>
-              <a:rPr lang="de-DE" dirty="0" smtClean="0"/>
+              <a:rPr lang="de-DE" dirty="0"/>
               <a:t>Agenda ohne Sub ohne Bild  </a:t>
             </a:r>
-            <a:endParaRPr lang="de-DE" dirty="0"/>
           </a:p>
         </p:txBody>
       </p:sp>
@@ -6152,17 +6099,13 @@
             <a:pPr lvl="0"/>
             <a:r>
               <a:rPr lang="de-DE" dirty="0"/>
-              <a:t>Textmasterformat </a:t>
-            </a:r>
-            <a:r>
-              <a:rPr lang="de-DE" dirty="0" smtClean="0"/>
-              <a:t>bearbeiten</a:t>
+              <a:t>Textmasterformat bearbeiten</a:t>
             </a:r>
           </a:p>
           <a:p>
             <a:pPr lvl="0"/>
             <a:r>
-              <a:rPr lang="de-DE" dirty="0" smtClean="0"/>
+              <a:rPr lang="de-DE" dirty="0"/>
               <a:t>Zweite Zeile</a:t>
             </a:r>
           </a:p>
@@ -6348,10 +6291,9 @@
           </a:lstStyle>
           <a:p>
             <a:r>
-              <a:rPr lang="de-DE" dirty="0" smtClean="0"/>
+              <a:rPr lang="de-DE" dirty="0"/>
               <a:t>Agenda mit Sub Bild </a:t>
             </a:r>
-            <a:endParaRPr lang="de-DE" dirty="0"/>
           </a:p>
         </p:txBody>
       </p:sp>
@@ -6508,14 +6450,13 @@
           <a:p>
             <a:pPr lvl="0"/>
             <a:r>
-              <a:rPr lang="de-DE" dirty="0" err="1" smtClean="0"/>
+              <a:rPr lang="de-DE" dirty="0" err="1"/>
               <a:t>Subtitel</a:t>
             </a:r>
             <a:r>
-              <a:rPr lang="de-DE" dirty="0" smtClean="0"/>
+              <a:rPr lang="de-DE" dirty="0"/>
               <a:t> der Agenda</a:t>
             </a:r>
-            <a:endParaRPr lang="de-DE" dirty="0"/>
           </a:p>
         </p:txBody>
       </p:sp>
@@ -6588,17 +6529,13 @@
             <a:pPr lvl="0"/>
             <a:r>
               <a:rPr lang="de-DE" dirty="0"/>
-              <a:t>Textmasterformat </a:t>
-            </a:r>
-            <a:r>
-              <a:rPr lang="de-DE" dirty="0" smtClean="0"/>
-              <a:t>bearbeiten</a:t>
+              <a:t>Textmasterformat bearbeiten</a:t>
             </a:r>
           </a:p>
           <a:p>
             <a:pPr lvl="0"/>
             <a:r>
-              <a:rPr lang="de-DE" dirty="0" smtClean="0"/>
+              <a:rPr lang="de-DE" dirty="0"/>
               <a:t>Zweite Zeile</a:t>
             </a:r>
           </a:p>
@@ -6784,10 +6721,9 @@
           </a:lstStyle>
           <a:p>
             <a:r>
-              <a:rPr lang="de-DE" dirty="0" smtClean="0"/>
+              <a:rPr lang="de-DE" dirty="0"/>
               <a:t>Agenda mit Sub ohne Bild </a:t>
             </a:r>
-            <a:endParaRPr lang="de-DE" dirty="0"/>
           </a:p>
         </p:txBody>
       </p:sp>
@@ -6944,14 +6880,13 @@
           <a:p>
             <a:pPr lvl="0"/>
             <a:r>
-              <a:rPr lang="de-DE" dirty="0" err="1" smtClean="0"/>
+              <a:rPr lang="de-DE" dirty="0" err="1"/>
               <a:t>Subtitel</a:t>
             </a:r>
             <a:r>
-              <a:rPr lang="de-DE" dirty="0" smtClean="0"/>
+              <a:rPr lang="de-DE" dirty="0"/>
               <a:t> der Agenda</a:t>
             </a:r>
-            <a:endParaRPr lang="de-DE" dirty="0"/>
           </a:p>
         </p:txBody>
       </p:sp>
@@ -7024,17 +6959,13 @@
             <a:pPr lvl="0"/>
             <a:r>
               <a:rPr lang="de-DE" dirty="0"/>
-              <a:t>Textmasterformat </a:t>
-            </a:r>
-            <a:r>
-              <a:rPr lang="de-DE" dirty="0" smtClean="0"/>
-              <a:t>bearbeiten</a:t>
+              <a:t>Textmasterformat bearbeiten</a:t>
             </a:r>
           </a:p>
           <a:p>
             <a:pPr lvl="0"/>
             <a:r>
-              <a:rPr lang="de-DE" dirty="0" smtClean="0"/>
+              <a:rPr lang="de-DE" dirty="0"/>
               <a:t>Zweite Zeile</a:t>
             </a:r>
           </a:p>
@@ -7090,7 +7021,7 @@
           <a:lstStyle/>
           <a:p>
             <a:r>
-              <a:rPr lang="en-US" smtClean="0"/>
+              <a:rPr lang="en-US"/>
               <a:t>Experts in agile software engineering</a:t>
             </a:r>
             <a:endParaRPr lang="de-DE" dirty="0"/>
@@ -7124,10 +7055,9 @@
           </a:lstStyle>
           <a:p>
             <a:r>
-              <a:rPr lang="de-DE" dirty="0" smtClean="0"/>
+              <a:rPr lang="de-DE" dirty="0"/>
               <a:t>Übung ohne Sub Bild</a:t>
             </a:r>
-            <a:endParaRPr lang="de-DE" dirty="0"/>
           </a:p>
         </p:txBody>
       </p:sp>
@@ -7425,10 +7355,9 @@
           </a:lstStyle>
           <a:p>
             <a:r>
-              <a:rPr lang="de-DE" dirty="0" smtClean="0"/>
+              <a:rPr lang="de-DE" dirty="0"/>
               <a:t>10 min</a:t>
             </a:r>
-            <a:endParaRPr lang="de-DE" dirty="0"/>
           </a:p>
         </p:txBody>
       </p:sp>
@@ -7478,7 +7407,7 @@
           <a:lstStyle/>
           <a:p>
             <a:r>
-              <a:rPr lang="en-US" smtClean="0"/>
+              <a:rPr lang="en-US"/>
               <a:t>Experts in agile software engineering</a:t>
             </a:r>
             <a:endParaRPr lang="de-DE" dirty="0"/>
@@ -7512,10 +7441,9 @@
           </a:lstStyle>
           <a:p>
             <a:r>
-              <a:rPr lang="de-DE" dirty="0" smtClean="0"/>
+              <a:rPr lang="de-DE" dirty="0"/>
               <a:t>Übung ohne Sub ohne Bild</a:t>
             </a:r>
-            <a:endParaRPr lang="de-DE" dirty="0"/>
           </a:p>
         </p:txBody>
       </p:sp>
@@ -7813,10 +7741,9 @@
           </a:lstStyle>
           <a:p>
             <a:r>
-              <a:rPr lang="de-DE" dirty="0" smtClean="0"/>
+              <a:rPr lang="de-DE" dirty="0"/>
               <a:t>10 min</a:t>
             </a:r>
-            <a:endParaRPr lang="de-DE" dirty="0"/>
           </a:p>
         </p:txBody>
       </p:sp>
@@ -7866,7 +7793,7 @@
           <a:lstStyle/>
           <a:p>
             <a:r>
-              <a:rPr lang="en-US" smtClean="0"/>
+              <a:rPr lang="en-US"/>
               <a:t>Experts in agile software engineering</a:t>
             </a:r>
             <a:endParaRPr lang="de-DE" dirty="0"/>
@@ -7900,10 +7827,9 @@
           </a:lstStyle>
           <a:p>
             <a:r>
-              <a:rPr lang="de-DE" dirty="0" smtClean="0"/>
+              <a:rPr lang="de-DE" dirty="0"/>
               <a:t>Übung mit Sub Bild</a:t>
             </a:r>
-            <a:endParaRPr lang="de-DE" dirty="0"/>
           </a:p>
         </p:txBody>
       </p:sp>
@@ -8201,10 +8127,9 @@
           </a:lstStyle>
           <a:p>
             <a:r>
-              <a:rPr lang="de-DE" dirty="0" smtClean="0"/>
+              <a:rPr lang="de-DE" dirty="0"/>
               <a:t>10 min</a:t>
             </a:r>
-            <a:endParaRPr lang="de-DE" dirty="0"/>
           </a:p>
         </p:txBody>
       </p:sp>
@@ -8241,14 +8166,13 @@
           <a:p>
             <a:pPr lvl="0"/>
             <a:r>
-              <a:rPr lang="de-DE" dirty="0" err="1" smtClean="0"/>
+              <a:rPr lang="de-DE" dirty="0" err="1"/>
               <a:t>Subtitel</a:t>
             </a:r>
             <a:r>
-              <a:rPr lang="de-DE" dirty="0" smtClean="0"/>
+              <a:rPr lang="de-DE" dirty="0"/>
               <a:t> der Agenda</a:t>
             </a:r>
-            <a:endParaRPr lang="de-DE" dirty="0"/>
           </a:p>
         </p:txBody>
       </p:sp>
@@ -8343,7 +8267,7 @@
           <a:lstStyle/>
           <a:p>
             <a:r>
-              <a:rPr lang="de-DE" dirty="0" smtClean="0"/>
+              <a:rPr lang="de-DE" dirty="0"/>
               <a:t>Mastertitelformat bearbeiten</a:t>
             </a:r>
             <a:endParaRPr lang="en-US" dirty="0"/>
@@ -8377,35 +8301,35 @@
           <a:p>
             <a:pPr lvl="0"/>
             <a:r>
-              <a:rPr lang="de-DE" dirty="0" smtClean="0"/>
+              <a:rPr lang="de-DE" dirty="0"/>
               <a:t>Erste Ebene</a:t>
             </a:r>
           </a:p>
           <a:p>
             <a:pPr lvl="1"/>
             <a:r>
-              <a:rPr lang="de-DE" dirty="0" smtClean="0"/>
+              <a:rPr lang="de-DE" dirty="0"/>
               <a:t>Zweite Ebene</a:t>
             </a:r>
           </a:p>
           <a:p>
             <a:pPr lvl="2"/>
             <a:r>
-              <a:rPr lang="de-DE" dirty="0" smtClean="0"/>
+              <a:rPr lang="de-DE" dirty="0"/>
               <a:t>Dritte Ebene</a:t>
             </a:r>
           </a:p>
           <a:p>
             <a:pPr lvl="3"/>
             <a:r>
-              <a:rPr lang="de-DE" dirty="0" smtClean="0"/>
+              <a:rPr lang="de-DE" dirty="0"/>
               <a:t>Vierte Ebene</a:t>
             </a:r>
           </a:p>
           <a:p>
             <a:pPr lvl="4"/>
             <a:r>
-              <a:rPr lang="de-DE" dirty="0" smtClean="0"/>
+              <a:rPr lang="de-DE" dirty="0"/>
               <a:t>Fünfte Ebene</a:t>
             </a:r>
             <a:endParaRPr lang="en-US" dirty="0"/>
@@ -8444,7 +8368,7 @@
           </a:lstStyle>
           <a:p>
             <a:r>
-              <a:rPr lang="en-US" smtClean="0"/>
+              <a:rPr lang="en-US"/>
               <a:t>Experts in agile software engineering</a:t>
             </a:r>
             <a:endParaRPr lang="de-DE" dirty="0"/>
@@ -8750,7 +8674,7 @@
           </a:lstStyle>
           <a:p>
             <a:r>
-              <a:rPr lang="de-DE" dirty="0" smtClean="0"/>
+              <a:rPr lang="de-DE" dirty="0"/>
               <a:t>© 2018 andrena objects ag  </a:t>
             </a:r>
           </a:p>
@@ -8783,13 +8707,6 @@
     <p:sldLayoutId id="2147493556" r:id="rId16"/>
     <p:sldLayoutId id="2147493557" r:id="rId17"/>
   </p:sldLayoutIdLst>
-  <p:timing>
-    <p:tnLst>
-      <p:par>
-        <p:cTn id="1" dur="indefinite" restart="never" nodeType="tmRoot"/>
-      </p:par>
-    </p:tnLst>
-  </p:timing>
   <p:hf hdr="0" dt="0"/>
   <p:txStyles>
     <p:titleStyle>
@@ -9166,7 +9083,7 @@
           </a:lstStyle>
           <a:p>
             <a:r>
-              <a:rPr lang="en-US" smtClean="0">
+              <a:rPr lang="en-US">
                 <a:solidFill>
                   <a:srgbClr val="BABABA"/>
                 </a:solidFill>
@@ -9488,7 +9405,7 @@
           </a:lstStyle>
           <a:p>
             <a:r>
-              <a:rPr lang="de-DE" dirty="0" smtClean="0">
+              <a:rPr lang="de-DE" dirty="0">
                 <a:solidFill>
                   <a:srgbClr val="BABABA"/>
                 </a:solidFill>
@@ -9524,7 +9441,7 @@
           <a:lstStyle/>
           <a:p>
             <a:r>
-              <a:rPr lang="de-DE" dirty="0" smtClean="0"/>
+              <a:rPr lang="de-DE" dirty="0"/>
               <a:t>Mastertitelformat bearbeiten</a:t>
             </a:r>
             <a:endParaRPr lang="en-US" dirty="0"/>
@@ -9558,35 +9475,35 @@
           <a:p>
             <a:pPr lvl="0"/>
             <a:r>
-              <a:rPr lang="de-DE" dirty="0" smtClean="0"/>
+              <a:rPr lang="de-DE" dirty="0"/>
               <a:t>Erste Ebene</a:t>
             </a:r>
           </a:p>
           <a:p>
             <a:pPr lvl="1"/>
             <a:r>
-              <a:rPr lang="de-DE" dirty="0" smtClean="0"/>
+              <a:rPr lang="de-DE" dirty="0"/>
               <a:t>Zweite Ebene</a:t>
             </a:r>
           </a:p>
           <a:p>
             <a:pPr lvl="2"/>
             <a:r>
-              <a:rPr lang="de-DE" dirty="0" smtClean="0"/>
+              <a:rPr lang="de-DE" dirty="0"/>
               <a:t>Dritte Ebene</a:t>
             </a:r>
           </a:p>
           <a:p>
             <a:pPr lvl="3"/>
             <a:r>
-              <a:rPr lang="de-DE" dirty="0" smtClean="0"/>
+              <a:rPr lang="de-DE" dirty="0"/>
               <a:t>Vierte Ebene</a:t>
             </a:r>
           </a:p>
           <a:p>
             <a:pPr lvl="4"/>
             <a:r>
-              <a:rPr lang="de-DE" dirty="0" smtClean="0"/>
+              <a:rPr lang="de-DE" dirty="0"/>
               <a:t>Fünfte Ebene</a:t>
             </a:r>
             <a:endParaRPr lang="en-US" dirty="0"/>
@@ -9908,26 +9825,22 @@
           <a:p>
             <a:r>
               <a:rPr lang="de-DE" dirty="0" err="1"/>
-              <a:t>a</a:t>
-            </a:r>
-            <a:r>
-              <a:rPr lang="de-DE" dirty="0" err="1" smtClean="0"/>
-              <a:t>ndrena</a:t>
-            </a:r>
-            <a:r>
-              <a:rPr lang="de-DE" dirty="0" smtClean="0"/>
+              <a:t>andrena</a:t>
+            </a:r>
+            <a:r>
+              <a:rPr lang="de-DE" dirty="0"/>
               <a:t> </a:t>
             </a:r>
             <a:r>
-              <a:rPr lang="de-DE" dirty="0" err="1" smtClean="0"/>
+              <a:rPr lang="de-DE" dirty="0" err="1"/>
               <a:t>objects</a:t>
             </a:r>
             <a:r>
-              <a:rPr lang="de-DE" dirty="0" smtClean="0"/>
+              <a:rPr lang="de-DE" dirty="0"/>
               <a:t> </a:t>
             </a:r>
             <a:r>
-              <a:rPr lang="de-DE" dirty="0" err="1" smtClean="0"/>
+              <a:rPr lang="de-DE" dirty="0" err="1"/>
               <a:t>ag</a:t>
             </a:r>
             <a:endParaRPr lang="de-DE" dirty="0"/>
@@ -9942,6 +9855,34 @@
           </p:cNvSpPr>
           <p:nvPr>
             <p:ph type="title"/>
+          </p:nvPr>
+        </p:nvSpPr>
+        <p:spPr/>
+        <p:txBody>
+          <a:bodyPr>
+            <a:normAutofit/>
+          </a:bodyPr>
+          <a:lstStyle/>
+          <a:p>
+            <a:r>
+              <a:rPr lang="de-DE" dirty="0" err="1"/>
+              <a:t>JUnit</a:t>
+            </a:r>
+            <a:r>
+              <a:rPr lang="de-DE" dirty="0"/>
+              <a:t> 5</a:t>
+            </a:r>
+          </a:p>
+        </p:txBody>
+      </p:sp>
+      <p:sp>
+        <p:nvSpPr>
+          <p:cNvPr id="4" name="Textplatzhalter 3"/>
+          <p:cNvSpPr>
+            <a:spLocks noGrp="1"/>
+          </p:cNvSpPr>
+          <p:nvPr>
+            <p:ph type="body" sz="quarter" idx="10"/>
           </p:nvPr>
         </p:nvSpPr>
         <p:spPr/>
@@ -9950,25 +9891,20 @@
           <a:lstStyle/>
           <a:p>
             <a:r>
-              <a:rPr lang="de-DE" dirty="0" err="1" smtClean="0"/>
-              <a:t>Junit</a:t>
-            </a:r>
-            <a:r>
-              <a:rPr lang="de-DE" dirty="0" smtClean="0"/>
-              <a:t> 5</a:t>
-            </a:r>
-            <a:endParaRPr lang="de-DE" dirty="0"/>
-          </a:p>
-        </p:txBody>
-      </p:sp>
-      <p:sp>
-        <p:nvSpPr>
-          <p:cNvPr id="4" name="Textplatzhalter 3"/>
-          <p:cNvSpPr>
-            <a:spLocks noGrp="1"/>
-          </p:cNvSpPr>
-          <p:nvPr>
-            <p:ph type="body" sz="quarter" idx="10"/>
+              <a:rPr lang="de-DE" dirty="0"/>
+              <a:t>Das will ich jetzt auch benutzen!</a:t>
+            </a:r>
+          </a:p>
+        </p:txBody>
+      </p:sp>
+      <p:sp>
+        <p:nvSpPr>
+          <p:cNvPr id="9" name="Textplatzhalter 8"/>
+          <p:cNvSpPr>
+            <a:spLocks noGrp="1"/>
+          </p:cNvSpPr>
+          <p:nvPr>
+            <p:ph type="body" sz="quarter" idx="11"/>
           </p:nvPr>
         </p:nvSpPr>
         <p:spPr/>
@@ -9977,21 +9913,26 @@
           <a:lstStyle/>
           <a:p>
             <a:r>
-              <a:rPr lang="de-DE" dirty="0" smtClean="0"/>
-              <a:t>Das will ich jetzt auch benutzen!</a:t>
-            </a:r>
-            <a:endParaRPr lang="de-DE" dirty="0"/>
-          </a:p>
-        </p:txBody>
-      </p:sp>
-      <p:sp>
-        <p:nvSpPr>
-          <p:cNvPr id="9" name="Textplatzhalter 8"/>
-          <p:cNvSpPr>
-            <a:spLocks noGrp="1"/>
-          </p:cNvSpPr>
-          <p:nvPr>
-            <p:ph type="body" sz="quarter" idx="11"/>
+              <a:rPr lang="de-DE" dirty="0"/>
+              <a:t>22. Juni 2018</a:t>
+            </a:r>
+          </a:p>
+          <a:p>
+            <a:r>
+              <a:rPr lang="de-DE" dirty="0"/>
+              <a:t>Entwicklertag Karlsruhe</a:t>
+            </a:r>
+          </a:p>
+        </p:txBody>
+      </p:sp>
+      <p:sp>
+        <p:nvSpPr>
+          <p:cNvPr id="10" name="Textplatzhalter 9"/>
+          <p:cNvSpPr>
+            <a:spLocks noGrp="1"/>
+          </p:cNvSpPr>
+          <p:nvPr>
+            <p:ph type="body" sz="quarter" idx="12"/>
           </p:nvPr>
         </p:nvSpPr>
         <p:spPr/>
@@ -10000,56 +9941,53 @@
           <a:lstStyle/>
           <a:p>
             <a:r>
-              <a:rPr lang="de-DE" dirty="0" smtClean="0"/>
-              <a:t>22. Juni 2018</a:t>
-            </a:r>
-          </a:p>
-          <a:p>
-            <a:r>
-              <a:rPr lang="de-DE" dirty="0" smtClean="0"/>
-              <a:t>Entwicklertag Karlsruhe</a:t>
-            </a:r>
-            <a:endParaRPr lang="de-DE" dirty="0"/>
-          </a:p>
-        </p:txBody>
-      </p:sp>
-      <p:sp>
-        <p:nvSpPr>
-          <p:cNvPr id="10" name="Textplatzhalter 9"/>
-          <p:cNvSpPr>
-            <a:spLocks noGrp="1"/>
-          </p:cNvSpPr>
-          <p:nvPr>
-            <p:ph type="body" sz="quarter" idx="12"/>
-          </p:nvPr>
-        </p:nvSpPr>
-        <p:spPr/>
+              <a:rPr lang="de-DE" dirty="0"/>
+              <a:t>Claudia Fuhrmann</a:t>
+            </a:r>
+          </a:p>
+        </p:txBody>
+      </p:sp>
+      <p:sp>
+        <p:nvSpPr>
+          <p:cNvPr id="11" name="Textplatzhalter 10"/>
+          <p:cNvSpPr>
+            <a:spLocks noGrp="1"/>
+          </p:cNvSpPr>
+          <p:nvPr>
+            <p:ph type="body" sz="quarter" idx="13"/>
+          </p:nvPr>
+        </p:nvSpPr>
+        <p:spPr>
+          <a:xfrm>
+            <a:off x="6029999" y="4186125"/>
+            <a:ext cx="2852827" cy="549275"/>
+          </a:xfrm>
+        </p:spPr>
         <p:txBody>
           <a:bodyPr/>
           <a:lstStyle/>
           <a:p>
             <a:r>
-              <a:rPr lang="de-DE" dirty="0" smtClean="0"/>
-              <a:t>Claudia Fuhrmann</a:t>
-            </a:r>
-            <a:endParaRPr lang="de-DE" dirty="0"/>
-          </a:p>
-        </p:txBody>
-      </p:sp>
-      <p:sp>
-        <p:nvSpPr>
-          <p:cNvPr id="11" name="Textplatzhalter 10"/>
-          <p:cNvSpPr>
-            <a:spLocks noGrp="1"/>
-          </p:cNvSpPr>
-          <p:nvPr>
-            <p:ph type="body" sz="quarter" idx="13"/>
+              <a:rPr lang="de-DE" dirty="0"/>
+              <a:t>Felix Schlosser</a:t>
+            </a:r>
+          </a:p>
+        </p:txBody>
+      </p:sp>
+      <p:sp>
+        <p:nvSpPr>
+          <p:cNvPr id="12" name="Textplatzhalter 11"/>
+          <p:cNvSpPr>
+            <a:spLocks noGrp="1"/>
+          </p:cNvSpPr>
+          <p:nvPr>
+            <p:ph type="body" sz="quarter" idx="14"/>
           </p:nvPr>
         </p:nvSpPr>
         <p:spPr>
           <a:xfrm>
-            <a:off x="6029999" y="4186125"/>
-            <a:ext cx="2852827" cy="549275"/>
+            <a:off x="6030913" y="3833813"/>
+            <a:ext cx="2550008" cy="420687"/>
           </a:xfrm>
         </p:spPr>
         <p:txBody>
@@ -10057,38 +9995,9 @@
           <a:lstStyle/>
           <a:p>
             <a:r>
-              <a:rPr lang="de-DE" dirty="0" smtClean="0"/>
-              <a:t>Felix Schlosser</a:t>
-            </a:r>
-            <a:endParaRPr lang="de-DE" dirty="0"/>
-          </a:p>
-        </p:txBody>
-      </p:sp>
-      <p:sp>
-        <p:nvSpPr>
-          <p:cNvPr id="12" name="Textplatzhalter 11"/>
-          <p:cNvSpPr>
-            <a:spLocks noGrp="1"/>
-          </p:cNvSpPr>
-          <p:nvPr>
-            <p:ph type="body" sz="quarter" idx="14"/>
-          </p:nvPr>
-        </p:nvSpPr>
-        <p:spPr>
-          <a:xfrm>
-            <a:off x="6030913" y="3833813"/>
-            <a:ext cx="2550008" cy="420687"/>
-          </a:xfrm>
-        </p:spPr>
-        <p:txBody>
-          <a:bodyPr/>
-          <a:lstStyle/>
-          <a:p>
-            <a:r>
-              <a:rPr lang="de-DE" sz="1800" dirty="0" smtClean="0"/>
+              <a:rPr lang="de-DE" sz="1800" dirty="0"/>
               <a:t>Dirk Tröndle</a:t>
             </a:r>
-            <a:endParaRPr lang="de-DE" sz="1800" dirty="0"/>
           </a:p>
         </p:txBody>
       </p:sp>
@@ -10115,12 +10024,8 @@
           <a:lstStyle/>
           <a:p>
             <a:r>
-              <a:rPr lang="de-DE" sz="1800" dirty="0" smtClean="0"/>
-              <a:t>Johannes </a:t>
-            </a:r>
-            <a:r>
               <a:rPr lang="de-DE" sz="1800" dirty="0"/>
-              <a:t>Göring</a:t>
+              <a:t>Johannes Göring</a:t>
             </a:r>
           </a:p>
         </p:txBody>
@@ -10135,13 +10040,6 @@
   <p:clrMapOvr>
     <a:masterClrMapping/>
   </p:clrMapOvr>
-  <p:timing>
-    <p:tnLst>
-      <p:par>
-        <p:cTn id="1" dur="indefinite" restart="never" nodeType="tmRoot"/>
-      </p:par>
-    </p:tnLst>
-  </p:timing>
 </p:sld>
 </file>
 
@@ -10178,7 +10076,7 @@
           <a:lstStyle/>
           <a:p>
             <a:r>
-              <a:rPr lang="en-US" smtClean="0"/>
+              <a:rPr lang="en-US"/>
               <a:t>Experts in agile software engineering</a:t>
             </a:r>
             <a:endParaRPr lang="de-DE" dirty="0"/>
@@ -10201,10 +10099,9 @@
           <a:lstStyle/>
           <a:p>
             <a:r>
-              <a:rPr lang="de-DE" dirty="0" smtClean="0"/>
+              <a:rPr lang="de-DE" dirty="0"/>
               <a:t>Beispiel für „Text mit Sub ohne Bild“</a:t>
             </a:r>
-            <a:endParaRPr lang="de-DE" dirty="0"/>
           </a:p>
         </p:txBody>
       </p:sp>
@@ -10227,18 +10124,17 @@
               <a:buNone/>
             </a:pPr>
             <a:r>
-              <a:rPr lang="de-DE" dirty="0" smtClean="0"/>
+              <a:rPr lang="de-DE" dirty="0"/>
               <a:t>Hier ist jetzt über die ganze Folie hinweg Platz für Text. Wenn man ein Bild möchte, bitte das Layout „Titel </a:t>
             </a:r>
             <a:r>
-              <a:rPr lang="de-DE" dirty="0" err="1" smtClean="0"/>
+              <a:rPr lang="de-DE" dirty="0" err="1"/>
               <a:t>subtitel</a:t>
             </a:r>
             <a:r>
-              <a:rPr lang="de-DE" dirty="0" smtClean="0"/>
+              <a:rPr lang="de-DE" dirty="0"/>
               <a:t> Text Platz für Bild“ nehmen.</a:t>
             </a:r>
-            <a:endParaRPr lang="de-DE" dirty="0"/>
           </a:p>
         </p:txBody>
       </p:sp>
@@ -10337,11 +10233,11 @@
           <a:lstStyle/>
           <a:p>
             <a:r>
-              <a:rPr lang="de-DE" dirty="0" smtClean="0"/>
+              <a:rPr lang="de-DE" dirty="0"/>
               <a:t>Ich bin wie immer der </a:t>
             </a:r>
             <a:r>
-              <a:rPr lang="de-DE" dirty="0" err="1" smtClean="0"/>
+              <a:rPr lang="de-DE" dirty="0" err="1"/>
               <a:t>Subtitel</a:t>
             </a:r>
             <a:endParaRPr lang="de-DE" dirty="0"/>
@@ -10394,10 +10290,9 @@
           <a:lstStyle/>
           <a:p>
             <a:r>
-              <a:rPr lang="de-DE" dirty="0" smtClean="0"/>
+              <a:rPr lang="de-DE" dirty="0"/>
               <a:t>Beispiel für „Titel ohne Sub“ (hat auch sonst nix, alles frei)</a:t>
             </a:r>
-            <a:endParaRPr lang="de-DE" dirty="0"/>
           </a:p>
         </p:txBody>
       </p:sp>
@@ -10441,7 +10336,7 @@
           <a:lstStyle/>
           <a:p>
             <a:r>
-              <a:rPr lang="en-US" smtClean="0"/>
+              <a:rPr lang="en-US"/>
               <a:t>Experts in agile software engineering</a:t>
             </a:r>
             <a:endParaRPr lang="de-DE" dirty="0"/>
@@ -10494,10 +10389,9 @@
           <a:lstStyle/>
           <a:p>
             <a:r>
-              <a:rPr lang="de-DE" dirty="0" smtClean="0"/>
+              <a:rPr lang="de-DE" dirty="0"/>
               <a:t>Beispiel für „Titel mit Sub“ (und sonst nix)</a:t>
             </a:r>
-            <a:endParaRPr lang="de-DE" dirty="0"/>
           </a:p>
         </p:txBody>
       </p:sp>
@@ -10541,11 +10435,11 @@
           <a:lstStyle/>
           <a:p>
             <a:r>
-              <a:rPr lang="de-DE" dirty="0" smtClean="0"/>
+              <a:rPr lang="de-DE" dirty="0"/>
               <a:t>Ich bin das Beispiel für einen </a:t>
             </a:r>
             <a:r>
-              <a:rPr lang="de-DE" dirty="0" err="1" smtClean="0"/>
+              <a:rPr lang="de-DE" dirty="0" err="1"/>
               <a:t>Subtitel</a:t>
             </a:r>
             <a:endParaRPr lang="de-DE" dirty="0"/>
@@ -10568,7 +10462,7 @@
           <a:lstStyle/>
           <a:p>
             <a:r>
-              <a:rPr lang="en-US" smtClean="0"/>
+              <a:rPr lang="en-US"/>
               <a:t>Experts in agile software engineering</a:t>
             </a:r>
             <a:endParaRPr lang="de-DE" dirty="0"/>
@@ -10659,10 +10553,9 @@
           <a:lstStyle/>
           <a:p>
             <a:r>
-              <a:rPr lang="de-DE" dirty="0" smtClean="0"/>
+              <a:rPr lang="de-DE" dirty="0"/>
               <a:t>Ich bin ein Beispiel für „2 Blöcke Vergleich“</a:t>
             </a:r>
-            <a:endParaRPr lang="de-DE" dirty="0"/>
           </a:p>
         </p:txBody>
       </p:sp>
@@ -10761,7 +10654,7 @@
           <a:lstStyle/>
           <a:p>
             <a:r>
-              <a:rPr lang="en-US" smtClean="0"/>
+              <a:rPr lang="en-US"/>
               <a:t>Experts in agile software engineering</a:t>
             </a:r>
             <a:endParaRPr lang="de-DE" dirty="0"/>
@@ -10852,10 +10745,9 @@
           <a:lstStyle/>
           <a:p>
             <a:r>
-              <a:rPr lang="de-DE" dirty="0" smtClean="0"/>
+              <a:rPr lang="de-DE" dirty="0"/>
               <a:t>Bsp. für „Zwischenfolie Titel einzeilig mit Sub“</a:t>
             </a:r>
-            <a:endParaRPr lang="de-DE" dirty="0"/>
           </a:p>
         </p:txBody>
       </p:sp>
@@ -10875,10 +10767,9 @@
           <a:lstStyle/>
           <a:p>
             <a:r>
-              <a:rPr lang="de-DE" dirty="0" smtClean="0"/>
+              <a:rPr lang="de-DE" dirty="0"/>
               <a:t>Ich bin der Untertitel dieser Folie</a:t>
             </a:r>
-            <a:endParaRPr lang="de-DE" dirty="0"/>
           </a:p>
         </p:txBody>
       </p:sp>
@@ -10962,18 +10853,9 @@
           <a:lstStyle/>
           <a:p>
             <a:r>
-              <a:rPr lang="de-DE" dirty="0" smtClean="0"/>
-              <a:t>Ich bin ein Beispiel für „Zwischenfolie Titel zweizeilig</a:t>
-            </a:r>
-            <a:r>
-              <a:rPr lang="de-DE" dirty="0"/>
-              <a:t> </a:t>
-            </a:r>
-            <a:r>
-              <a:rPr lang="de-DE" dirty="0" smtClean="0"/>
-              <a:t>mit Sub“ und habe 2 Zeilen</a:t>
-            </a:r>
-            <a:endParaRPr lang="de-DE" dirty="0"/>
+              <a:rPr lang="de-DE" dirty="0"/>
+              <a:t>Ich bin ein Beispiel für „Zwischenfolie Titel zweizeilig mit Sub“ und habe 2 Zeilen</a:t>
+            </a:r>
           </a:p>
         </p:txBody>
       </p:sp>
@@ -10993,10 +10875,9 @@
           <a:lstStyle/>
           <a:p>
             <a:r>
-              <a:rPr lang="de-DE" dirty="0" smtClean="0"/>
+              <a:rPr lang="de-DE" dirty="0"/>
               <a:t>Ich bin immer noch der Untertitel</a:t>
             </a:r>
-            <a:endParaRPr lang="de-DE" dirty="0"/>
           </a:p>
         </p:txBody>
       </p:sp>
@@ -11016,14 +10897,14 @@
           <a:lstStyle/>
           <a:p>
             <a:r>
-              <a:rPr lang="en-US" smtClean="0">
+              <a:rPr lang="en-US">
                 <a:solidFill>
                   <a:srgbClr val="BABABA"/>
                 </a:solidFill>
               </a:rPr>
               <a:t>Experts in agile software engineering</a:t>
             </a:r>
-            <a:endParaRPr lang="de-DE" dirty="0" smtClean="0">
+            <a:endParaRPr lang="de-DE" dirty="0">
               <a:solidFill>
                 <a:srgbClr val="BABABA"/>
               </a:solidFill>
@@ -11077,7 +10958,7 @@
           <a:lstStyle/>
           <a:p>
             <a:r>
-              <a:rPr lang="en-US" smtClean="0"/>
+              <a:rPr lang="en-US"/>
               <a:t>Experts in agile software engineering</a:t>
             </a:r>
             <a:endParaRPr lang="en-US" dirty="0"/>
@@ -11126,10 +11007,9 @@
           <a:lstStyle/>
           <a:p>
             <a:r>
-              <a:rPr lang="de-DE" dirty="0" smtClean="0"/>
+              <a:rPr lang="de-DE" dirty="0"/>
               <a:t>WIP – Agenda</a:t>
             </a:r>
-            <a:endParaRPr lang="de-DE" dirty="0"/>
           </a:p>
         </p:txBody>
       </p:sp>
@@ -11149,23 +11029,21 @@
           <a:lstStyle/>
           <a:p>
             <a:r>
-              <a:rPr lang="de-DE" dirty="0" smtClean="0"/>
+              <a:rPr lang="de-DE" dirty="0"/>
               <a:t>Projekt Einrichten</a:t>
             </a:r>
-            <a:endParaRPr lang="de-DE" dirty="0" smtClean="0"/>
-          </a:p>
-          <a:p>
-            <a:r>
-              <a:rPr lang="de-DE" dirty="0" smtClean="0"/>
+          </a:p>
+          <a:p>
+            <a:r>
+              <a:rPr lang="de-DE" dirty="0"/>
               <a:t>Kurze Erklärung</a:t>
             </a:r>
           </a:p>
           <a:p>
             <a:r>
-              <a:rPr lang="de-DE" dirty="0" smtClean="0"/>
+              <a:rPr lang="de-DE" dirty="0"/>
               <a:t>Aufgaben</a:t>
             </a:r>
-            <a:endParaRPr lang="de-DE" dirty="0" smtClean="0"/>
           </a:p>
         </p:txBody>
       </p:sp>
@@ -11245,7 +11123,7 @@
           <a:lstStyle/>
           <a:p>
             <a:r>
-              <a:rPr lang="en-US" smtClean="0"/>
+              <a:rPr lang="en-US"/>
               <a:t>Experts in agile software engineering</a:t>
             </a:r>
             <a:endParaRPr lang="de-DE" dirty="0"/>
@@ -11268,12 +11146,8 @@
           <a:lstStyle/>
           <a:p>
             <a:r>
-              <a:rPr lang="en-US" dirty="0" smtClean="0"/>
-              <a:t>Abstract </a:t>
-            </a:r>
-            <a:r>
               <a:rPr lang="en-US" dirty="0"/>
-              <a:t>Tests </a:t>
+              <a:t>Abstract Tests </a:t>
             </a:r>
             <a:r>
               <a:rPr lang="en-US" dirty="0" err="1"/>
@@ -11281,11 +11155,7 @@
             </a:r>
             <a:r>
               <a:rPr lang="en-US" dirty="0"/>
-              <a:t> </a:t>
-            </a:r>
-            <a:r>
-              <a:rPr lang="en-US" dirty="0" smtClean="0"/>
-              <a:t>Contracts</a:t>
+              <a:t> Contracts</a:t>
             </a:r>
             <a:endParaRPr lang="de-DE" dirty="0"/>
           </a:p>
@@ -11310,11 +11180,11 @@
               <a:buNone/>
             </a:pPr>
             <a:r>
-              <a:rPr lang="de-DE" dirty="0" err="1" smtClean="0"/>
-              <a:t>Junit</a:t>
-            </a:r>
-            <a:r>
-              <a:rPr lang="de-DE" dirty="0" smtClean="0"/>
+              <a:rPr lang="de-DE" dirty="0" err="1"/>
+              <a:t>JUnit</a:t>
+            </a:r>
+            <a:r>
+              <a:rPr lang="de-DE" dirty="0"/>
               <a:t> 4 verwendet Abstract Tests </a:t>
             </a:r>
           </a:p>
@@ -11329,15 +11199,15 @@
               <a:buNone/>
             </a:pPr>
             <a:r>
-              <a:rPr lang="de-DE" dirty="0" smtClean="0"/>
+              <a:rPr lang="de-DE" dirty="0"/>
               <a:t>Mit </a:t>
             </a:r>
             <a:r>
-              <a:rPr lang="de-DE" dirty="0" err="1" smtClean="0"/>
-              <a:t>Junit</a:t>
-            </a:r>
-            <a:r>
-              <a:rPr lang="de-DE" dirty="0" smtClean="0"/>
+              <a:rPr lang="de-DE" dirty="0" err="1"/>
+              <a:t>JUnit</a:t>
+            </a:r>
+            <a:r>
+              <a:rPr lang="de-DE" dirty="0"/>
               <a:t> 5 und Java 8 steht eine neue Schreibweise zur Verfügung.</a:t>
             </a:r>
           </a:p>
@@ -11346,15 +11216,15 @@
               <a:buNone/>
             </a:pPr>
             <a:r>
-              <a:rPr lang="de-DE" dirty="0" smtClean="0"/>
+              <a:rPr lang="de-DE" dirty="0"/>
               <a:t>Hier werden solche Test als </a:t>
             </a:r>
             <a:r>
-              <a:rPr lang="de-DE" dirty="0" err="1" smtClean="0"/>
+              <a:rPr lang="de-DE" dirty="0" err="1"/>
               <a:t>Contracts</a:t>
             </a:r>
             <a:r>
-              <a:rPr lang="de-DE" dirty="0" smtClean="0"/>
+              <a:rPr lang="de-DE" dirty="0"/>
               <a:t> bezeichnet.</a:t>
             </a:r>
           </a:p>
@@ -11369,10 +11239,9 @@
               <a:buNone/>
             </a:pPr>
             <a:r>
-              <a:rPr lang="de-DE" dirty="0" smtClean="0"/>
+              <a:rPr lang="de-DE" dirty="0"/>
               <a:t>Sie nutzten Java 8 Interfaces.</a:t>
             </a:r>
-            <a:endParaRPr lang="de-DE" dirty="0"/>
           </a:p>
         </p:txBody>
       </p:sp>
@@ -11550,7 +11419,7 @@
           <a:lstStyle/>
           <a:p>
             <a:r>
-              <a:rPr lang="en-US" smtClean="0"/>
+              <a:rPr lang="en-US"/>
               <a:t>Experts in agile software engineering</a:t>
             </a:r>
             <a:endParaRPr lang="de-DE" dirty="0"/>
@@ -11608,7 +11477,7 @@
           <a:lstStyle/>
           <a:p>
             <a:r>
-              <a:rPr lang="de-DE" dirty="0" smtClean="0"/>
+              <a:rPr lang="de-DE" dirty="0"/>
               <a:t>Alt:</a:t>
             </a:r>
           </a:p>
@@ -11617,45 +11486,41 @@
               <a:buNone/>
             </a:pPr>
             <a:r>
-              <a:rPr lang="de-DE" dirty="0" smtClean="0"/>
+              <a:rPr lang="de-DE" dirty="0"/>
               <a:t>@</a:t>
             </a:r>
             <a:r>
-              <a:rPr lang="de-DE" dirty="0" err="1" smtClean="0"/>
+              <a:rPr lang="de-DE" dirty="0" err="1"/>
               <a:t>Rule</a:t>
             </a:r>
-            <a:endParaRPr lang="de-DE" dirty="0" smtClean="0"/>
+            <a:endParaRPr lang="de-DE" dirty="0"/>
           </a:p>
           <a:p>
             <a:pPr marL="0" indent="0">
               <a:buNone/>
             </a:pPr>
             <a:r>
-              <a:rPr lang="de-DE" dirty="0" err="1" smtClean="0"/>
+              <a:rPr lang="de-DE" dirty="0" err="1"/>
               <a:t>ExpectedException</a:t>
             </a:r>
             <a:r>
-              <a:rPr lang="de-DE" dirty="0" smtClean="0"/>
+              <a:rPr lang="de-DE" dirty="0"/>
               <a:t> </a:t>
             </a:r>
             <a:r>
-              <a:rPr lang="de-DE" dirty="0" err="1" smtClean="0"/>
+              <a:rPr lang="de-DE" dirty="0" err="1"/>
               <a:t>expect</a:t>
             </a:r>
             <a:r>
-              <a:rPr lang="de-DE" dirty="0" smtClean="0"/>
-              <a:t> </a:t>
-            </a:r>
-            <a:r>
-              <a:rPr lang="de-DE" dirty="0"/>
-              <a:t>= </a:t>
-            </a:r>
-            <a:r>
-              <a:rPr lang="de-DE" dirty="0" err="1" smtClean="0"/>
+              <a:rPr lang="de-DE" dirty="0"/>
+              <a:t> = </a:t>
+            </a:r>
+            <a:r>
+              <a:rPr lang="de-DE" dirty="0" err="1"/>
               <a:t>ExpectedException.none</a:t>
             </a:r>
             <a:r>
-              <a:rPr lang="de-DE" dirty="0" smtClean="0"/>
+              <a:rPr lang="de-DE" dirty="0"/>
               <a:t>();</a:t>
             </a:r>
           </a:p>
@@ -11664,7 +11529,7 @@
               <a:buNone/>
             </a:pPr>
             <a:r>
-              <a:rPr lang="de-DE" dirty="0" smtClean="0"/>
+              <a:rPr lang="de-DE" dirty="0"/>
               <a:t>…</a:t>
             </a:r>
           </a:p>
@@ -11673,62 +11538,59 @@
               <a:buNone/>
             </a:pPr>
             <a:r>
-              <a:rPr lang="de-DE" dirty="0" err="1" smtClean="0"/>
+              <a:rPr lang="de-DE" dirty="0" err="1"/>
               <a:t>expect.expect</a:t>
             </a:r>
             <a:r>
-              <a:rPr lang="de-DE" dirty="0" smtClean="0"/>
+              <a:rPr lang="de-DE" dirty="0"/>
               <a:t>(</a:t>
             </a:r>
             <a:r>
-              <a:rPr lang="de-DE" dirty="0" err="1" smtClean="0"/>
+              <a:rPr lang="de-DE" dirty="0" err="1"/>
               <a:t>Exception.class</a:t>
             </a:r>
             <a:r>
               <a:rPr lang="de-DE" dirty="0"/>
               <a:t>);</a:t>
             </a:r>
-            <a:endParaRPr lang="de-DE" dirty="0" smtClean="0"/>
           </a:p>
           <a:p>
             <a:endParaRPr lang="de-DE" dirty="0"/>
           </a:p>
           <a:p>
             <a:r>
-              <a:rPr lang="de-DE" dirty="0" smtClean="0"/>
+              <a:rPr lang="de-DE" dirty="0"/>
               <a:t>Neu:</a:t>
             </a:r>
-            <a:endParaRPr lang="de-DE" dirty="0"/>
           </a:p>
           <a:p>
             <a:pPr marL="0" indent="0">
               <a:buNone/>
             </a:pPr>
             <a:r>
-              <a:rPr lang="de-DE" dirty="0" err="1" smtClean="0"/>
+              <a:rPr lang="de-DE" dirty="0" err="1"/>
               <a:t>assertThrows</a:t>
             </a:r>
             <a:r>
-              <a:rPr lang="de-DE" dirty="0" smtClean="0"/>
+              <a:rPr lang="de-DE" dirty="0"/>
               <a:t>(</a:t>
             </a:r>
             <a:r>
-              <a:rPr lang="de-DE" dirty="0" err="1" smtClean="0"/>
+              <a:rPr lang="de-DE" dirty="0" err="1"/>
               <a:t>Exception.class</a:t>
             </a:r>
             <a:r>
-              <a:rPr lang="de-DE" dirty="0" smtClean="0"/>
+              <a:rPr lang="de-DE" dirty="0"/>
               <a:t>, </a:t>
             </a:r>
             <a:r>
-              <a:rPr lang="de-DE" dirty="0" err="1" smtClean="0"/>
+              <a:rPr lang="de-DE" dirty="0" err="1"/>
               <a:t>ExceptionThrowingFunction</a:t>
             </a:r>
             <a:r>
-              <a:rPr lang="de-DE" dirty="0" smtClean="0"/>
+              <a:rPr lang="de-DE" dirty="0"/>
               <a:t>);</a:t>
             </a:r>
-            <a:endParaRPr lang="de-DE" dirty="0" smtClean="0"/>
           </a:p>
         </p:txBody>
       </p:sp>
@@ -11876,7 +11738,7 @@
           <a:lstStyle/>
           <a:p>
             <a:r>
-              <a:rPr lang="en-US" smtClean="0"/>
+              <a:rPr lang="en-US"/>
               <a:t>Experts in agile software engineering</a:t>
             </a:r>
             <a:endParaRPr lang="de-DE" dirty="0"/>
@@ -11899,10 +11761,9 @@
           <a:lstStyle/>
           <a:p>
             <a:r>
-              <a:rPr lang="de-DE" dirty="0" smtClean="0"/>
+              <a:rPr lang="de-DE" dirty="0"/>
               <a:t>Ich bin „Übung mit Sub Bild“</a:t>
             </a:r>
-            <a:endParaRPr lang="de-DE" dirty="0"/>
           </a:p>
         </p:txBody>
       </p:sp>
@@ -11922,10 +11783,9 @@
           <a:lstStyle/>
           <a:p>
             <a:r>
-              <a:rPr lang="de-DE" dirty="0" smtClean="0"/>
+              <a:rPr lang="de-DE" dirty="0"/>
               <a:t>Ich bin die Beschreibung der Übung. Neben mir ist noch Platz für ein Bild.</a:t>
             </a:r>
-            <a:endParaRPr lang="de-DE" dirty="0"/>
           </a:p>
         </p:txBody>
       </p:sp>
@@ -12043,11 +11903,11 @@
           <a:lstStyle/>
           <a:p>
             <a:r>
-              <a:rPr lang="de-DE" dirty="0" smtClean="0"/>
+              <a:rPr lang="de-DE" dirty="0"/>
               <a:t>Daher bin ich der </a:t>
             </a:r>
             <a:r>
-              <a:rPr lang="de-DE" dirty="0" err="1" smtClean="0"/>
+              <a:rPr lang="de-DE" dirty="0" err="1"/>
               <a:t>Subtitel</a:t>
             </a:r>
             <a:endParaRPr lang="de-DE" dirty="0"/>
@@ -12130,7 +11990,7 @@
           <a:lstStyle/>
           <a:p>
             <a:r>
-              <a:rPr lang="en-US" smtClean="0"/>
+              <a:rPr lang="en-US"/>
               <a:t>Experts in agile software engineering</a:t>
             </a:r>
             <a:endParaRPr lang="de-DE" dirty="0"/>
@@ -12153,10 +12013,9 @@
           <a:lstStyle/>
           <a:p>
             <a:r>
-              <a:rPr lang="de-DE" dirty="0" smtClean="0"/>
+              <a:rPr lang="de-DE" dirty="0"/>
               <a:t>Ich bin „Übung mit Sub ohne Bild“</a:t>
             </a:r>
-            <a:endParaRPr lang="de-DE" dirty="0"/>
           </a:p>
         </p:txBody>
       </p:sp>
@@ -12176,14 +12035,13 @@
           <a:lstStyle/>
           <a:p>
             <a:r>
-              <a:rPr lang="de-DE" dirty="0" smtClean="0"/>
+              <a:rPr lang="de-DE" dirty="0"/>
               <a:t>Hier ist die Beschreibung der Übung so lang, dass auf ein Bild </a:t>
             </a:r>
             <a:r>
-              <a:rPr lang="de-DE" smtClean="0"/>
+              <a:rPr lang="de-DE"/>
               <a:t>verzichtet wurde. </a:t>
             </a:r>
-            <a:endParaRPr lang="de-DE"/>
           </a:p>
         </p:txBody>
       </p:sp>
@@ -12301,11 +12159,11 @@
           <a:lstStyle/>
           <a:p>
             <a:r>
-              <a:rPr lang="de-DE" dirty="0" smtClean="0"/>
+              <a:rPr lang="de-DE" dirty="0"/>
               <a:t>Ich bin wie immer der </a:t>
             </a:r>
             <a:r>
-              <a:rPr lang="de-DE" dirty="0" err="1" smtClean="0"/>
+              <a:rPr lang="de-DE" dirty="0" err="1"/>
               <a:t>Subtitel</a:t>
             </a:r>
             <a:endParaRPr lang="de-DE" dirty="0"/>
@@ -12358,18 +12216,17 @@
           <a:lstStyle/>
           <a:p>
             <a:r>
-              <a:rPr lang="de-DE" dirty="0" smtClean="0"/>
+              <a:rPr lang="de-DE" dirty="0"/>
               <a:t>Ein </a:t>
             </a:r>
             <a:r>
-              <a:rPr lang="de-DE" dirty="0" err="1" smtClean="0"/>
+              <a:rPr lang="de-DE" dirty="0" err="1"/>
               <a:t>Bsp</a:t>
             </a:r>
             <a:r>
-              <a:rPr lang="de-DE" dirty="0" smtClean="0"/>
+              <a:rPr lang="de-DE" dirty="0"/>
               <a:t> für das Layout „Text ohne Sub Bild“</a:t>
             </a:r>
-            <a:endParaRPr lang="de-DE" dirty="0"/>
           </a:p>
         </p:txBody>
       </p:sp>
@@ -12508,20 +12365,20 @@
               <a:buNone/>
             </a:pPr>
             <a:r>
-              <a:rPr lang="de-DE" dirty="0" smtClean="0"/>
+              <a:rPr lang="de-DE" dirty="0"/>
               <a:t>Hier ist Platz für den Text.</a:t>
             </a:r>
           </a:p>
           <a:p>
             <a:r>
-              <a:rPr lang="de-DE" dirty="0" smtClean="0"/>
+              <a:rPr lang="de-DE" dirty="0"/>
               <a:t>Auch für Aufzählungen</a:t>
             </a:r>
           </a:p>
           <a:p>
             <a:pPr lvl="1"/>
             <a:r>
-              <a:rPr lang="de-DE" dirty="0" smtClean="0"/>
+              <a:rPr lang="de-DE" dirty="0"/>
               <a:t>und Unter-Aufzählungen</a:t>
             </a:r>
           </a:p>
@@ -12530,7 +12387,7 @@
               <a:buNone/>
             </a:pPr>
             <a:r>
-              <a:rPr lang="de-DE" dirty="0" smtClean="0"/>
+              <a:rPr lang="de-DE" dirty="0"/>
               <a:t>Ab hier ist die Aufzählung zu Ende.</a:t>
             </a:r>
           </a:p>
@@ -12539,7 +12396,7 @@
               <a:buNone/>
             </a:pPr>
             <a:r>
-              <a:rPr lang="de-DE" dirty="0" smtClean="0"/>
+              <a:rPr lang="de-DE" dirty="0"/>
               <a:t>Noch eine Zeile Text.</a:t>
             </a:r>
           </a:p>
@@ -12548,7 +12405,7 @@
               <a:buNone/>
             </a:pPr>
             <a:r>
-              <a:rPr lang="de-DE" dirty="0" smtClean="0"/>
+              <a:rPr lang="de-DE" dirty="0"/>
               <a:t>Noch eine Zeile Text.</a:t>
             </a:r>
           </a:p>
@@ -12557,7 +12414,7 @@
               <a:buNone/>
             </a:pPr>
             <a:r>
-              <a:rPr lang="de-DE" dirty="0" smtClean="0"/>
+              <a:rPr lang="de-DE" dirty="0"/>
               <a:t>Noch eine Zeile Text.</a:t>
             </a:r>
           </a:p>
@@ -12566,7 +12423,7 @@
               <a:buNone/>
             </a:pPr>
             <a:r>
-              <a:rPr lang="de-DE" dirty="0" smtClean="0"/>
+              <a:rPr lang="de-DE" dirty="0"/>
               <a:t>Noch eine Zeile Text.</a:t>
             </a:r>
           </a:p>
@@ -12575,7 +12432,7 @@
               <a:buNone/>
             </a:pPr>
             <a:r>
-              <a:rPr lang="de-DE" dirty="0" smtClean="0"/>
+              <a:rPr lang="de-DE" dirty="0"/>
               <a:t>Noch eine Zeile Text. </a:t>
             </a:r>
           </a:p>
@@ -12584,10 +12441,9 @@
               <a:buNone/>
             </a:pPr>
             <a:r>
-              <a:rPr lang="de-DE" dirty="0" smtClean="0"/>
+              <a:rPr lang="de-DE" dirty="0"/>
               <a:t>Die letzte Zeile Text.</a:t>
             </a:r>
-            <a:endParaRPr lang="de-DE" dirty="0"/>
           </a:p>
         </p:txBody>
       </p:sp>
@@ -12607,7 +12463,7 @@
           <a:lstStyle/>
           <a:p>
             <a:r>
-              <a:rPr lang="en-US" smtClean="0"/>
+              <a:rPr lang="en-US"/>
               <a:t>Experts in agile software engineering</a:t>
             </a:r>
             <a:endParaRPr lang="de-DE" dirty="0"/>
@@ -12660,10 +12516,9 @@
           <a:lstStyle/>
           <a:p>
             <a:r>
-              <a:rPr lang="de-DE" dirty="0" smtClean="0"/>
+              <a:rPr lang="de-DE" dirty="0"/>
               <a:t>Beispiel für ´“Text ohne Sub ohne Bild“</a:t>
             </a:r>
-            <a:endParaRPr lang="de-DE" dirty="0"/>
           </a:p>
         </p:txBody>
       </p:sp>
@@ -12683,7 +12538,7 @@
           <a:lstStyle/>
           <a:p>
             <a:r>
-              <a:rPr lang="de-DE" dirty="0" smtClean="0"/>
+              <a:rPr lang="de-DE" dirty="0"/>
               <a:t>Und ich bin dann der Text, der hier erscheinen kann. Ich laufe über die ganze Folie, und wie immer, wenn das der Fall ist, gibt es kein Bild. Wenn man ein Bild möchte, bitte das Layout „Text ohne Sub Bild“ nehmen.</a:t>
             </a:r>
           </a:p>
@@ -12784,7 +12639,7 @@
           <a:lstStyle/>
           <a:p>
             <a:r>
-              <a:rPr lang="en-US" smtClean="0"/>
+              <a:rPr lang="en-US"/>
               <a:t>Experts in agile software engineering</a:t>
             </a:r>
             <a:endParaRPr lang="de-DE" dirty="0"/>
@@ -12837,7 +12692,7 @@
           <a:lstStyle/>
           <a:p>
             <a:r>
-              <a:rPr lang="en-US" smtClean="0"/>
+              <a:rPr lang="en-US"/>
               <a:t>Experts in agile software engineering</a:t>
             </a:r>
             <a:endParaRPr lang="de-DE" dirty="0"/>
@@ -12860,10 +12715,9 @@
           <a:lstStyle/>
           <a:p>
             <a:r>
-              <a:rPr lang="de-DE" dirty="0" smtClean="0"/>
+              <a:rPr lang="de-DE" dirty="0"/>
               <a:t>Beispiel für „Text mit Sub Bild“</a:t>
             </a:r>
-            <a:endParaRPr lang="de-DE" dirty="0"/>
           </a:p>
         </p:txBody>
       </p:sp>
@@ -12883,16 +12737,15 @@
           <a:lstStyle/>
           <a:p>
             <a:r>
-              <a:rPr lang="de-DE" dirty="0" smtClean="0"/>
+              <a:rPr lang="de-DE" dirty="0"/>
               <a:t>Hier steht wie immer Text</a:t>
             </a:r>
           </a:p>
           <a:p>
             <a:r>
-              <a:rPr lang="de-DE" dirty="0" smtClean="0"/>
+              <a:rPr lang="de-DE" dirty="0"/>
               <a:t>Gerne auch mit Aufzählungen</a:t>
             </a:r>
-            <a:endParaRPr lang="de-DE" dirty="0"/>
           </a:p>
         </p:txBody>
       </p:sp>
@@ -12937,11 +12790,11 @@
           <a:lstStyle/>
           <a:p>
             <a:r>
-              <a:rPr lang="de-DE" dirty="0" smtClean="0"/>
+              <a:rPr lang="de-DE" dirty="0"/>
               <a:t>Hat im Gegensatz zu „Text ohne Sub Bild“ diesen </a:t>
             </a:r>
             <a:r>
-              <a:rPr lang="de-DE" dirty="0" err="1" smtClean="0"/>
+              <a:rPr lang="de-DE" dirty="0" err="1"/>
               <a:t>Subtitel</a:t>
             </a:r>
             <a:endParaRPr lang="de-DE" dirty="0"/>
@@ -14212,6 +14065,24 @@
 </file>
 
 <file path=customXml/item1.xml><?xml version="1.0" encoding="utf-8"?>
+<p:properties xmlns:p="http://schemas.microsoft.com/office/2006/metadata/properties" xmlns:xsi="http://www.w3.org/2001/XMLSchema-instance" xmlns:pc="http://schemas.microsoft.com/office/infopath/2007/PartnerControls">
+  <documentManagement>
+    <_Version xmlns="http://schemas.microsoft.com/sharepoint/v3/fields" xsi:nil="true"/>
+    <_Status xmlns="http://schemas.microsoft.com/sharepoint/v3/fields">Not Started</_Status>
+  </documentManagement>
+</p:properties>
+</file>
+
+<file path=customXml/item2.xml><?xml version="1.0" encoding="utf-8"?>
+<?mso-contentType ?>
+<FormTemplates xmlns="http://schemas.microsoft.com/sharepoint/v3/contenttype/forms">
+  <Display>DocumentLibraryForm</Display>
+  <Edit>DocumentLibraryForm</Edit>
+  <New>DocumentLibraryForm</New>
+</FormTemplates>
+</file>
+
+<file path=customXml/item3.xml><?xml version="1.0" encoding="utf-8"?>
 <ct:contentTypeSchema xmlns:ct="http://schemas.microsoft.com/office/2006/metadata/contentType" xmlns:ma="http://schemas.microsoft.com/office/2006/metadata/properties/metaAttributes" ct:_="" ma:_="" ma:contentTypeName="Document" ma:contentTypeID="0x0101000DE64AEEDD9B7A4D93545ACBE97D4615" ma:contentTypeVersion="2" ma:contentTypeDescription="Create a new document." ma:contentTypeScope="" ma:versionID="f49002b78e3a4a71b814eef46a983816">
   <xsd:schema xmlns:xsd="http://www.w3.org/2001/XMLSchema" xmlns:xs="http://www.w3.org/2001/XMLSchema" xmlns:p="http://schemas.microsoft.com/office/2006/metadata/properties" xmlns:ns2="http://schemas.microsoft.com/sharepoint/v3/fields" targetNamespace="http://schemas.microsoft.com/office/2006/metadata/properties" ma:root="true" ma:fieldsID="38f6db2dd0d9a0cf6a8dc37be32b365b" ns2:_="">
     <xsd:import namespace="http://schemas.microsoft.com/sharepoint/v3/fields"/>
@@ -14355,25 +14226,31 @@
 </ct:contentTypeSchema>
 </file>
 
-<file path=customXml/item2.xml><?xml version="1.0" encoding="utf-8"?>
-<p:properties xmlns:p="http://schemas.microsoft.com/office/2006/metadata/properties" xmlns:xsi="http://www.w3.org/2001/XMLSchema-instance" xmlns:pc="http://schemas.microsoft.com/office/infopath/2007/PartnerControls">
-  <documentManagement>
-    <_Version xmlns="http://schemas.microsoft.com/sharepoint/v3/fields" xsi:nil="true"/>
-    <_Status xmlns="http://schemas.microsoft.com/sharepoint/v3/fields">Not Started</_Status>
-  </documentManagement>
-</p:properties>
+<file path=customXml/itemProps1.xml><?xml version="1.0" encoding="utf-8"?>
+<ds:datastoreItem xmlns:ds="http://schemas.openxmlformats.org/officeDocument/2006/customXml" ds:itemID="{7B6F2769-7194-4217-93D3-3AF3A4742282}">
+  <ds:schemaRefs>
+    <ds:schemaRef ds:uri="http://schemas.microsoft.com/office/infopath/2007/PartnerControls"/>
+    <ds:schemaRef ds:uri="http://purl.org/dc/dcmitype/"/>
+    <ds:schemaRef ds:uri="http://purl.org/dc/terms/"/>
+    <ds:schemaRef ds:uri="http://schemas.microsoft.com/office/2006/documentManagement/types"/>
+    <ds:schemaRef ds:uri="http://schemas.openxmlformats.org/package/2006/metadata/core-properties"/>
+    <ds:schemaRef ds:uri="http://purl.org/dc/elements/1.1/"/>
+    <ds:schemaRef ds:uri="http://schemas.microsoft.com/sharepoint/v3/fields"/>
+    <ds:schemaRef ds:uri="http://schemas.microsoft.com/office/2006/metadata/properties"/>
+    <ds:schemaRef ds:uri="http://www.w3.org/XML/1998/namespace"/>
+  </ds:schemaRefs>
+</ds:datastoreItem>
 </file>
 
-<file path=customXml/item3.xml><?xml version="1.0" encoding="utf-8"?>
-<?mso-contentType ?>
-<FormTemplates xmlns="http://schemas.microsoft.com/sharepoint/v3/contenttype/forms">
-  <Display>DocumentLibraryForm</Display>
-  <Edit>DocumentLibraryForm</Edit>
-  <New>DocumentLibraryForm</New>
-</FormTemplates>
+<file path=customXml/itemProps2.xml><?xml version="1.0" encoding="utf-8"?>
+<ds:datastoreItem xmlns:ds="http://schemas.openxmlformats.org/officeDocument/2006/customXml" ds:itemID="{87D2A1B0-FF3E-4009-940D-AED0EB70AA20}">
+  <ds:schemaRefs>
+    <ds:schemaRef ds:uri="http://schemas.microsoft.com/sharepoint/v3/contenttype/forms"/>
+  </ds:schemaRefs>
+</ds:datastoreItem>
 </file>
 
-<file path=customXml/itemProps1.xml><?xml version="1.0" encoding="utf-8"?>
+<file path=customXml/itemProps3.xml><?xml version="1.0" encoding="utf-8"?>
 <ds:datastoreItem xmlns:ds="http://schemas.openxmlformats.org/officeDocument/2006/customXml" ds:itemID="{E4214858-785C-42F7-BE66-6D0E79395FC8}">
   <ds:schemaRefs>
     <ds:schemaRef ds:uri="http://schemas.microsoft.com/office/2006/metadata/contentType"/>
@@ -14389,28 +14266,4 @@
     <ds:schemaRef ds:uri="http://schemas.microsoft.com/internal/obd"/>
   </ds:schemaRefs>
 </ds:datastoreItem>
-</file>
-
-<file path=customXml/itemProps2.xml><?xml version="1.0" encoding="utf-8"?>
-<ds:datastoreItem xmlns:ds="http://schemas.openxmlformats.org/officeDocument/2006/customXml" ds:itemID="{7B6F2769-7194-4217-93D3-3AF3A4742282}">
-  <ds:schemaRefs>
-    <ds:schemaRef ds:uri="http://schemas.microsoft.com/office/infopath/2007/PartnerControls"/>
-    <ds:schemaRef ds:uri="http://purl.org/dc/dcmitype/"/>
-    <ds:schemaRef ds:uri="http://purl.org/dc/terms/"/>
-    <ds:schemaRef ds:uri="http://schemas.microsoft.com/office/2006/documentManagement/types"/>
-    <ds:schemaRef ds:uri="http://schemas.openxmlformats.org/package/2006/metadata/core-properties"/>
-    <ds:schemaRef ds:uri="http://purl.org/dc/elements/1.1/"/>
-    <ds:schemaRef ds:uri="http://schemas.microsoft.com/sharepoint/v3/fields"/>
-    <ds:schemaRef ds:uri="http://schemas.microsoft.com/office/2006/metadata/properties"/>
-    <ds:schemaRef ds:uri="http://www.w3.org/XML/1998/namespace"/>
-  </ds:schemaRefs>
-</ds:datastoreItem>
-</file>
-
-<file path=customXml/itemProps3.xml><?xml version="1.0" encoding="utf-8"?>
-<ds:datastoreItem xmlns:ds="http://schemas.openxmlformats.org/officeDocument/2006/customXml" ds:itemID="{87D2A1B0-FF3E-4009-940D-AED0EB70AA20}">
-  <ds:schemaRefs>
-    <ds:schemaRef ds:uri="http://schemas.microsoft.com/sharepoint/v3/contenttype/forms"/>
-  </ds:schemaRefs>
-</ds:datastoreItem>
 </file>
</xml_diff>